<commit_message>
Almost done with filter image
</commit_message>
<xml_diff>
--- a/Kristina/diagrams.pptx
+++ b/Kristina/diagrams.pptx
@@ -105,6 +105,11 @@
       </a:defRPr>
     </a:lvl9pPr>
   </p:defaultTextStyle>
+  <p:extLst>
+    <p:ext uri="{EFAFB233-063F-42B5-8137-9DF3F51BA10A}">
+      <p15:sldGuideLst xmlns:p15="http://schemas.microsoft.com/office/powerpoint/2012/main"/>
+    </p:ext>
+  </p:extLst>
 </p:presentation>
 </file>
 
@@ -3048,7 +3053,7 @@
         </p:nvGrpSpPr>
         <p:grpSpPr>
           <a:xfrm>
-            <a:off x="1430768" y="1897828"/>
+            <a:off x="2150633" y="1289124"/>
             <a:ext cx="435685" cy="898264"/>
             <a:chOff x="2684033" y="1005840"/>
             <a:chExt cx="435685" cy="898264"/>
@@ -3153,124 +3158,13 @@
       </p:grpSp>
       <p:grpSp>
         <p:nvGrpSpPr>
-          <p:cNvPr id="5" name="Group 4"/>
-          <p:cNvGrpSpPr/>
-          <p:nvPr/>
-        </p:nvGrpSpPr>
-        <p:grpSpPr>
-          <a:xfrm>
-            <a:off x="3351903" y="1897828"/>
-            <a:ext cx="435685" cy="898264"/>
-            <a:chOff x="2684033" y="1005840"/>
-            <a:chExt cx="435685" cy="898264"/>
-          </a:xfrm>
-        </p:grpSpPr>
-        <p:sp>
-          <p:nvSpPr>
-            <p:cNvPr id="6" name="Rectangle 5"/>
-            <p:cNvSpPr/>
-            <p:nvPr/>
-          </p:nvSpPr>
-          <p:spPr>
-            <a:xfrm>
-              <a:off x="2684033" y="1005840"/>
-              <a:ext cx="435685" cy="898264"/>
-            </a:xfrm>
-            <a:prstGeom prst="rect">
-              <a:avLst/>
-            </a:prstGeom>
-            <a:solidFill>
-              <a:schemeClr val="bg1"/>
-            </a:solidFill>
-            <a:ln>
-              <a:solidFill>
-                <a:schemeClr val="tx1"/>
-              </a:solidFill>
-            </a:ln>
-          </p:spPr>
-          <p:style>
-            <a:lnRef idx="2">
-              <a:schemeClr val="accent1">
-                <a:shade val="50000"/>
-              </a:schemeClr>
-            </a:lnRef>
-            <a:fillRef idx="1">
-              <a:schemeClr val="accent1"/>
-            </a:fillRef>
-            <a:effectRef idx="0">
-              <a:schemeClr val="accent1"/>
-            </a:effectRef>
-            <a:fontRef idx="minor">
-              <a:schemeClr val="lt1"/>
-            </a:fontRef>
-          </p:style>
-          <p:txBody>
-            <a:bodyPr rtlCol="0" anchor="ctr"/>
-            <a:lstStyle/>
-            <a:p>
-              <a:pPr algn="ctr"/>
-              <a:endParaRPr lang="en-US"/>
-            </a:p>
-          </p:txBody>
-        </p:sp>
-        <p:sp>
-          <p:nvSpPr>
-            <p:cNvPr id="7" name="Isosceles Triangle 6"/>
-            <p:cNvSpPr/>
-            <p:nvPr/>
-          </p:nvSpPr>
-          <p:spPr>
-            <a:xfrm rot="10800000">
-              <a:off x="2700169" y="1011219"/>
-              <a:ext cx="408791" cy="279698"/>
-            </a:xfrm>
-            <a:prstGeom prst="triangle">
-              <a:avLst/>
-            </a:prstGeom>
-            <a:solidFill>
-              <a:schemeClr val="bg1"/>
-            </a:solidFill>
-            <a:ln>
-              <a:solidFill>
-                <a:schemeClr val="tx1"/>
-              </a:solidFill>
-            </a:ln>
-          </p:spPr>
-          <p:style>
-            <a:lnRef idx="2">
-              <a:schemeClr val="accent1">
-                <a:shade val="50000"/>
-              </a:schemeClr>
-            </a:lnRef>
-            <a:fillRef idx="1">
-              <a:schemeClr val="accent1"/>
-            </a:fillRef>
-            <a:effectRef idx="0">
-              <a:schemeClr val="accent1"/>
-            </a:effectRef>
-            <a:fontRef idx="minor">
-              <a:schemeClr val="lt1"/>
-            </a:fontRef>
-          </p:style>
-          <p:txBody>
-            <a:bodyPr rtlCol="0" anchor="ctr"/>
-            <a:lstStyle/>
-            <a:p>
-              <a:pPr algn="ctr"/>
-              <a:endParaRPr lang="en-US"/>
-            </a:p>
-          </p:txBody>
-        </p:sp>
-      </p:grpSp>
-      <p:grpSp>
-        <p:nvGrpSpPr>
           <p:cNvPr id="8" name="Group 7"/>
           <p:cNvGrpSpPr/>
           <p:nvPr/>
         </p:nvGrpSpPr>
         <p:grpSpPr>
           <a:xfrm>
-            <a:off x="2391335" y="1891552"/>
+            <a:off x="3111200" y="1282848"/>
             <a:ext cx="435685" cy="898264"/>
             <a:chOff x="2684033" y="1005840"/>
             <a:chExt cx="435685" cy="898264"/>
@@ -3381,7 +3275,7 @@
         </p:nvGrpSpPr>
         <p:grpSpPr>
           <a:xfrm>
-            <a:off x="5938221" y="1891552"/>
+            <a:off x="5916705" y="1289124"/>
             <a:ext cx="435685" cy="898264"/>
             <a:chOff x="2684033" y="1005840"/>
             <a:chExt cx="435685" cy="898264"/>
@@ -3492,7 +3386,7 @@
         </p:nvGrpSpPr>
         <p:grpSpPr>
           <a:xfrm>
-            <a:off x="7851291" y="1891552"/>
+            <a:off x="7829775" y="1289124"/>
             <a:ext cx="435685" cy="898264"/>
             <a:chOff x="2684033" y="1005840"/>
             <a:chExt cx="435685" cy="898264"/>
@@ -3603,7 +3497,7 @@
         </p:nvGrpSpPr>
         <p:grpSpPr>
           <a:xfrm>
-            <a:off x="6897445" y="1891552"/>
+            <a:off x="6875929" y="1289124"/>
             <a:ext cx="435685" cy="898264"/>
             <a:chOff x="2684033" y="1005840"/>
             <a:chExt cx="435685" cy="898264"/>
@@ -3714,13 +3608,18 @@
         </p:nvSpPr>
         <p:spPr>
           <a:xfrm>
-            <a:off x="4539727" y="1714964"/>
+            <a:off x="4518211" y="1112536"/>
             <a:ext cx="634701" cy="923330"/>
           </a:xfrm>
           <a:prstGeom prst="rect">
             <a:avLst/>
           </a:prstGeom>
           <a:noFill/>
+          <a:ln>
+            <a:solidFill>
+              <a:schemeClr val="bg1"/>
+            </a:solidFill>
+          </a:ln>
         </p:spPr>
         <p:txBody>
           <a:bodyPr wrap="square" rtlCol="0">
@@ -3736,6 +3635,2106 @@
           </a:p>
         </p:txBody>
       </p:sp>
+      <p:sp>
+        <p:nvSpPr>
+          <p:cNvPr id="22" name="Oval 21"/>
+          <p:cNvSpPr/>
+          <p:nvPr/>
+        </p:nvSpPr>
+        <p:spPr>
+          <a:xfrm>
+            <a:off x="4628476" y="2431230"/>
+            <a:ext cx="414169" cy="414169"/>
+          </a:xfrm>
+          <a:prstGeom prst="ellipse">
+            <a:avLst/>
+          </a:prstGeom>
+          <a:solidFill>
+            <a:schemeClr val="bg1"/>
+          </a:solidFill>
+          <a:ln>
+            <a:solidFill>
+              <a:schemeClr val="tx1"/>
+            </a:solidFill>
+          </a:ln>
+        </p:spPr>
+        <p:style>
+          <a:lnRef idx="2">
+            <a:schemeClr val="accent1">
+              <a:shade val="50000"/>
+            </a:schemeClr>
+          </a:lnRef>
+          <a:fillRef idx="1">
+            <a:schemeClr val="accent1"/>
+          </a:fillRef>
+          <a:effectRef idx="0">
+            <a:schemeClr val="accent1"/>
+          </a:effectRef>
+          <a:fontRef idx="minor">
+            <a:schemeClr val="lt1"/>
+          </a:fontRef>
+        </p:style>
+        <p:txBody>
+          <a:bodyPr rtlCol="0" anchor="ctr"/>
+          <a:lstStyle/>
+          <a:p>
+            <a:pPr algn="ctr"/>
+            <a:r>
+              <a:rPr lang="en-US" dirty="0" smtClean="0">
+                <a:solidFill>
+                  <a:sysClr val="windowText" lastClr="000000"/>
+                </a:solidFill>
+              </a:rPr>
+              <a:t>+</a:t>
+            </a:r>
+            <a:endParaRPr lang="en-US" dirty="0">
+              <a:solidFill>
+                <a:sysClr val="windowText" lastClr="000000"/>
+              </a:solidFill>
+            </a:endParaRPr>
+          </a:p>
+        </p:txBody>
+      </p:sp>
+      <p:sp>
+        <p:nvSpPr>
+          <p:cNvPr id="23" name="Rectangle 22"/>
+          <p:cNvSpPr/>
+          <p:nvPr/>
+        </p:nvSpPr>
+        <p:spPr>
+          <a:xfrm>
+            <a:off x="4615027" y="3061906"/>
+            <a:ext cx="441063" cy="441063"/>
+          </a:xfrm>
+          <a:prstGeom prst="rect">
+            <a:avLst/>
+          </a:prstGeom>
+          <a:solidFill>
+            <a:schemeClr val="bg1"/>
+          </a:solidFill>
+          <a:ln>
+            <a:solidFill>
+              <a:schemeClr val="tx1"/>
+            </a:solidFill>
+          </a:ln>
+        </p:spPr>
+        <p:style>
+          <a:lnRef idx="2">
+            <a:schemeClr val="accent1">
+              <a:shade val="50000"/>
+            </a:schemeClr>
+          </a:lnRef>
+          <a:fillRef idx="1">
+            <a:schemeClr val="accent1"/>
+          </a:fillRef>
+          <a:effectRef idx="0">
+            <a:schemeClr val="accent1"/>
+          </a:effectRef>
+          <a:fontRef idx="minor">
+            <a:schemeClr val="lt1"/>
+          </a:fontRef>
+        </p:style>
+        <p:txBody>
+          <a:bodyPr rtlCol="0" anchor="ctr"/>
+          <a:lstStyle/>
+          <a:p>
+            <a:pPr algn="ctr"/>
+            <a:r>
+              <a:rPr lang="en-US" dirty="0" smtClean="0">
+                <a:solidFill>
+                  <a:sysClr val="windowText" lastClr="000000"/>
+                </a:solidFill>
+              </a:rPr>
+              <a:t>x</a:t>
+            </a:r>
+            <a:endParaRPr lang="en-US" dirty="0">
+              <a:solidFill>
+                <a:sysClr val="windowText" lastClr="000000"/>
+              </a:solidFill>
+            </a:endParaRPr>
+          </a:p>
+        </p:txBody>
+      </p:sp>
+      <p:cxnSp>
+        <p:nvCxnSpPr>
+          <p:cNvPr id="25" name="Straight Connector 24"/>
+          <p:cNvCxnSpPr>
+            <a:stCxn id="2" idx="3"/>
+            <a:endCxn id="9" idx="1"/>
+          </p:cNvCxnSpPr>
+          <p:nvPr/>
+        </p:nvCxnSpPr>
+        <p:spPr>
+          <a:xfrm flipV="1">
+            <a:off x="2586318" y="1731980"/>
+            <a:ext cx="524882" cy="6276"/>
+          </a:xfrm>
+          <a:prstGeom prst="line">
+            <a:avLst/>
+          </a:prstGeom>
+          <a:ln w="12700">
+            <a:solidFill>
+              <a:schemeClr val="tx1"/>
+            </a:solidFill>
+          </a:ln>
+        </p:spPr>
+        <p:style>
+          <a:lnRef idx="1">
+            <a:schemeClr val="accent1"/>
+          </a:lnRef>
+          <a:fillRef idx="0">
+            <a:schemeClr val="accent1"/>
+          </a:fillRef>
+          <a:effectRef idx="0">
+            <a:schemeClr val="accent1"/>
+          </a:effectRef>
+          <a:fontRef idx="minor">
+            <a:schemeClr val="tx1"/>
+          </a:fontRef>
+        </p:style>
+      </p:cxnSp>
+      <p:cxnSp>
+        <p:nvCxnSpPr>
+          <p:cNvPr id="27" name="Straight Connector 26"/>
+          <p:cNvCxnSpPr>
+            <a:stCxn id="9" idx="3"/>
+          </p:cNvCxnSpPr>
+          <p:nvPr/>
+        </p:nvCxnSpPr>
+        <p:spPr>
+          <a:xfrm>
+            <a:off x="3546885" y="1731980"/>
+            <a:ext cx="524883" cy="6276"/>
+          </a:xfrm>
+          <a:prstGeom prst="line">
+            <a:avLst/>
+          </a:prstGeom>
+          <a:ln w="12700">
+            <a:solidFill>
+              <a:schemeClr val="tx1"/>
+            </a:solidFill>
+          </a:ln>
+        </p:spPr>
+        <p:style>
+          <a:lnRef idx="1">
+            <a:schemeClr val="accent1"/>
+          </a:lnRef>
+          <a:fillRef idx="0">
+            <a:schemeClr val="accent1"/>
+          </a:fillRef>
+          <a:effectRef idx="0">
+            <a:schemeClr val="accent1"/>
+          </a:effectRef>
+          <a:fontRef idx="minor">
+            <a:schemeClr val="tx1"/>
+          </a:fontRef>
+        </p:style>
+      </p:cxnSp>
+      <p:cxnSp>
+        <p:nvCxnSpPr>
+          <p:cNvPr id="31" name="Straight Connector 30"/>
+          <p:cNvCxnSpPr>
+            <a:stCxn id="12" idx="1"/>
+          </p:cNvCxnSpPr>
+          <p:nvPr/>
+        </p:nvCxnSpPr>
+        <p:spPr>
+          <a:xfrm flipH="1">
+            <a:off x="5599355" y="1738256"/>
+            <a:ext cx="317350" cy="0"/>
+          </a:xfrm>
+          <a:prstGeom prst="line">
+            <a:avLst/>
+          </a:prstGeom>
+          <a:ln w="12700">
+            <a:solidFill>
+              <a:schemeClr val="tx1"/>
+            </a:solidFill>
+          </a:ln>
+        </p:spPr>
+        <p:style>
+          <a:lnRef idx="1">
+            <a:schemeClr val="accent1"/>
+          </a:lnRef>
+          <a:fillRef idx="0">
+            <a:schemeClr val="accent1"/>
+          </a:fillRef>
+          <a:effectRef idx="0">
+            <a:schemeClr val="accent1"/>
+          </a:effectRef>
+          <a:fontRef idx="minor">
+            <a:schemeClr val="tx1"/>
+          </a:fontRef>
+        </p:style>
+      </p:cxnSp>
+      <p:cxnSp>
+        <p:nvCxnSpPr>
+          <p:cNvPr id="33" name="Straight Connector 32"/>
+          <p:cNvCxnSpPr>
+            <a:stCxn id="12" idx="3"/>
+            <a:endCxn id="18" idx="1"/>
+          </p:cNvCxnSpPr>
+          <p:nvPr/>
+        </p:nvCxnSpPr>
+        <p:spPr>
+          <a:xfrm>
+            <a:off x="6352390" y="1738256"/>
+            <a:ext cx="523539" cy="0"/>
+          </a:xfrm>
+          <a:prstGeom prst="line">
+            <a:avLst/>
+          </a:prstGeom>
+          <a:ln w="12700">
+            <a:solidFill>
+              <a:schemeClr val="tx1"/>
+            </a:solidFill>
+          </a:ln>
+        </p:spPr>
+        <p:style>
+          <a:lnRef idx="1">
+            <a:schemeClr val="accent1"/>
+          </a:lnRef>
+          <a:fillRef idx="0">
+            <a:schemeClr val="accent1"/>
+          </a:fillRef>
+          <a:effectRef idx="0">
+            <a:schemeClr val="accent1"/>
+          </a:effectRef>
+          <a:fontRef idx="minor">
+            <a:schemeClr val="tx1"/>
+          </a:fontRef>
+        </p:style>
+      </p:cxnSp>
+      <p:cxnSp>
+        <p:nvCxnSpPr>
+          <p:cNvPr id="35" name="Straight Connector 34"/>
+          <p:cNvCxnSpPr>
+            <a:stCxn id="18" idx="3"/>
+            <a:endCxn id="15" idx="1"/>
+          </p:cNvCxnSpPr>
+          <p:nvPr/>
+        </p:nvCxnSpPr>
+        <p:spPr>
+          <a:xfrm>
+            <a:off x="7311614" y="1738256"/>
+            <a:ext cx="518161" cy="0"/>
+          </a:xfrm>
+          <a:prstGeom prst="line">
+            <a:avLst/>
+          </a:prstGeom>
+          <a:ln w="12700">
+            <a:solidFill>
+              <a:schemeClr val="tx1"/>
+            </a:solidFill>
+          </a:ln>
+        </p:spPr>
+        <p:style>
+          <a:lnRef idx="1">
+            <a:schemeClr val="accent1"/>
+          </a:lnRef>
+          <a:fillRef idx="0">
+            <a:schemeClr val="accent1"/>
+          </a:fillRef>
+          <a:effectRef idx="0">
+            <a:schemeClr val="accent1"/>
+          </a:effectRef>
+          <a:fontRef idx="minor">
+            <a:schemeClr val="tx1"/>
+          </a:fontRef>
+        </p:style>
+      </p:cxnSp>
+      <p:cxnSp>
+        <p:nvCxnSpPr>
+          <p:cNvPr id="37" name="Straight Connector 36"/>
+          <p:cNvCxnSpPr>
+            <a:stCxn id="2" idx="1"/>
+          </p:cNvCxnSpPr>
+          <p:nvPr/>
+        </p:nvCxnSpPr>
+        <p:spPr>
+          <a:xfrm flipH="1" flipV="1">
+            <a:off x="1591234" y="1731980"/>
+            <a:ext cx="559399" cy="6276"/>
+          </a:xfrm>
+          <a:prstGeom prst="line">
+            <a:avLst/>
+          </a:prstGeom>
+          <a:ln w="12700">
+            <a:solidFill>
+              <a:schemeClr val="tx1"/>
+            </a:solidFill>
+          </a:ln>
+        </p:spPr>
+        <p:style>
+          <a:lnRef idx="1">
+            <a:schemeClr val="accent1"/>
+          </a:lnRef>
+          <a:fillRef idx="0">
+            <a:schemeClr val="accent1"/>
+          </a:fillRef>
+          <a:effectRef idx="0">
+            <a:schemeClr val="accent1"/>
+          </a:effectRef>
+          <a:fontRef idx="minor">
+            <a:schemeClr val="tx1"/>
+          </a:fontRef>
+        </p:style>
+      </p:cxnSp>
+      <p:sp>
+        <p:nvSpPr>
+          <p:cNvPr id="38" name="Oval 37"/>
+          <p:cNvSpPr/>
+          <p:nvPr/>
+        </p:nvSpPr>
+        <p:spPr>
+          <a:xfrm>
+            <a:off x="4641921" y="4900108"/>
+            <a:ext cx="414169" cy="414169"/>
+          </a:xfrm>
+          <a:prstGeom prst="ellipse">
+            <a:avLst/>
+          </a:prstGeom>
+          <a:solidFill>
+            <a:schemeClr val="bg1"/>
+          </a:solidFill>
+          <a:ln>
+            <a:solidFill>
+              <a:schemeClr val="tx1"/>
+            </a:solidFill>
+          </a:ln>
+        </p:spPr>
+        <p:style>
+          <a:lnRef idx="2">
+            <a:schemeClr val="accent1">
+              <a:shade val="50000"/>
+            </a:schemeClr>
+          </a:lnRef>
+          <a:fillRef idx="1">
+            <a:schemeClr val="accent1"/>
+          </a:fillRef>
+          <a:effectRef idx="0">
+            <a:schemeClr val="accent1"/>
+          </a:effectRef>
+          <a:fontRef idx="minor">
+            <a:schemeClr val="lt1"/>
+          </a:fontRef>
+        </p:style>
+        <p:txBody>
+          <a:bodyPr rtlCol="0" anchor="ctr"/>
+          <a:lstStyle/>
+          <a:p>
+            <a:pPr algn="ctr"/>
+            <a:r>
+              <a:rPr lang="en-US" dirty="0" smtClean="0">
+                <a:solidFill>
+                  <a:sysClr val="windowText" lastClr="000000"/>
+                </a:solidFill>
+              </a:rPr>
+              <a:t>+</a:t>
+            </a:r>
+            <a:endParaRPr lang="en-US" dirty="0">
+              <a:solidFill>
+                <a:sysClr val="windowText" lastClr="000000"/>
+              </a:solidFill>
+            </a:endParaRPr>
+          </a:p>
+        </p:txBody>
+      </p:sp>
+      <p:sp>
+        <p:nvSpPr>
+          <p:cNvPr id="39" name="Oval 38"/>
+          <p:cNvSpPr/>
+          <p:nvPr/>
+        </p:nvSpPr>
+        <p:spPr>
+          <a:xfrm>
+            <a:off x="4628475" y="3719476"/>
+            <a:ext cx="414169" cy="414169"/>
+          </a:xfrm>
+          <a:prstGeom prst="ellipse">
+            <a:avLst/>
+          </a:prstGeom>
+          <a:solidFill>
+            <a:schemeClr val="bg1"/>
+          </a:solidFill>
+          <a:ln>
+            <a:solidFill>
+              <a:schemeClr val="tx1"/>
+            </a:solidFill>
+          </a:ln>
+        </p:spPr>
+        <p:style>
+          <a:lnRef idx="2">
+            <a:schemeClr val="accent1">
+              <a:shade val="50000"/>
+            </a:schemeClr>
+          </a:lnRef>
+          <a:fillRef idx="1">
+            <a:schemeClr val="accent1"/>
+          </a:fillRef>
+          <a:effectRef idx="0">
+            <a:schemeClr val="accent1"/>
+          </a:effectRef>
+          <a:fontRef idx="minor">
+            <a:schemeClr val="lt1"/>
+          </a:fontRef>
+        </p:style>
+        <p:txBody>
+          <a:bodyPr rtlCol="0" anchor="ctr"/>
+          <a:lstStyle/>
+          <a:p>
+            <a:pPr algn="ctr"/>
+            <a:r>
+              <a:rPr lang="en-US" dirty="0" smtClean="0">
+                <a:solidFill>
+                  <a:sysClr val="windowText" lastClr="000000"/>
+                </a:solidFill>
+              </a:rPr>
+              <a:t>+</a:t>
+            </a:r>
+            <a:endParaRPr lang="en-US" dirty="0">
+              <a:solidFill>
+                <a:sysClr val="windowText" lastClr="000000"/>
+              </a:solidFill>
+            </a:endParaRPr>
+          </a:p>
+        </p:txBody>
+      </p:sp>
+      <p:cxnSp>
+        <p:nvCxnSpPr>
+          <p:cNvPr id="41" name="Straight Connector 40"/>
+          <p:cNvCxnSpPr>
+            <a:stCxn id="2" idx="0"/>
+          </p:cNvCxnSpPr>
+          <p:nvPr/>
+        </p:nvCxnSpPr>
+        <p:spPr>
+          <a:xfrm flipH="1" flipV="1">
+            <a:off x="2366682" y="855233"/>
+            <a:ext cx="1794" cy="433891"/>
+          </a:xfrm>
+          <a:prstGeom prst="line">
+            <a:avLst/>
+          </a:prstGeom>
+          <a:ln w="12700">
+            <a:solidFill>
+              <a:schemeClr val="tx1"/>
+            </a:solidFill>
+          </a:ln>
+        </p:spPr>
+        <p:style>
+          <a:lnRef idx="1">
+            <a:schemeClr val="accent1"/>
+          </a:lnRef>
+          <a:fillRef idx="0">
+            <a:schemeClr val="accent1"/>
+          </a:fillRef>
+          <a:effectRef idx="0">
+            <a:schemeClr val="accent1"/>
+          </a:effectRef>
+          <a:fontRef idx="minor">
+            <a:schemeClr val="tx1"/>
+          </a:fontRef>
+        </p:style>
+      </p:cxnSp>
+      <p:cxnSp>
+        <p:nvCxnSpPr>
+          <p:cNvPr id="43" name="Straight Connector 42"/>
+          <p:cNvCxnSpPr>
+            <a:stCxn id="9" idx="0"/>
+          </p:cNvCxnSpPr>
+          <p:nvPr/>
+        </p:nvCxnSpPr>
+        <p:spPr>
+          <a:xfrm flipV="1">
+            <a:off x="3329043" y="855233"/>
+            <a:ext cx="10759" cy="427615"/>
+          </a:xfrm>
+          <a:prstGeom prst="line">
+            <a:avLst/>
+          </a:prstGeom>
+          <a:ln w="12700">
+            <a:solidFill>
+              <a:schemeClr val="tx1"/>
+            </a:solidFill>
+          </a:ln>
+        </p:spPr>
+        <p:style>
+          <a:lnRef idx="1">
+            <a:schemeClr val="accent1"/>
+          </a:lnRef>
+          <a:fillRef idx="0">
+            <a:schemeClr val="accent1"/>
+          </a:fillRef>
+          <a:effectRef idx="0">
+            <a:schemeClr val="accent1"/>
+          </a:effectRef>
+          <a:fontRef idx="minor">
+            <a:schemeClr val="tx1"/>
+          </a:fontRef>
+        </p:style>
+      </p:cxnSp>
+      <p:cxnSp>
+        <p:nvCxnSpPr>
+          <p:cNvPr id="45" name="Straight Connector 44"/>
+          <p:cNvCxnSpPr/>
+          <p:nvPr/>
+        </p:nvCxnSpPr>
+        <p:spPr>
+          <a:xfrm>
+            <a:off x="2366682" y="855233"/>
+            <a:ext cx="5696174" cy="0"/>
+          </a:xfrm>
+          <a:prstGeom prst="line">
+            <a:avLst/>
+          </a:prstGeom>
+          <a:ln w="12700">
+            <a:solidFill>
+              <a:schemeClr val="tx1"/>
+            </a:solidFill>
+          </a:ln>
+        </p:spPr>
+        <p:style>
+          <a:lnRef idx="1">
+            <a:schemeClr val="accent1"/>
+          </a:lnRef>
+          <a:fillRef idx="0">
+            <a:schemeClr val="accent1"/>
+          </a:fillRef>
+          <a:effectRef idx="0">
+            <a:schemeClr val="accent1"/>
+          </a:effectRef>
+          <a:fontRef idx="minor">
+            <a:schemeClr val="tx1"/>
+          </a:fontRef>
+        </p:style>
+      </p:cxnSp>
+      <p:cxnSp>
+        <p:nvCxnSpPr>
+          <p:cNvPr id="48" name="Straight Connector 47"/>
+          <p:cNvCxnSpPr>
+            <a:stCxn id="12" idx="0"/>
+          </p:cNvCxnSpPr>
+          <p:nvPr/>
+        </p:nvCxnSpPr>
+        <p:spPr>
+          <a:xfrm flipV="1">
+            <a:off x="6134548" y="855233"/>
+            <a:ext cx="2689" cy="433891"/>
+          </a:xfrm>
+          <a:prstGeom prst="line">
+            <a:avLst/>
+          </a:prstGeom>
+          <a:ln w="12700">
+            <a:solidFill>
+              <a:schemeClr val="tx1"/>
+            </a:solidFill>
+          </a:ln>
+        </p:spPr>
+        <p:style>
+          <a:lnRef idx="1">
+            <a:schemeClr val="accent1"/>
+          </a:lnRef>
+          <a:fillRef idx="0">
+            <a:schemeClr val="accent1"/>
+          </a:fillRef>
+          <a:effectRef idx="0">
+            <a:schemeClr val="accent1"/>
+          </a:effectRef>
+          <a:fontRef idx="minor">
+            <a:schemeClr val="tx1"/>
+          </a:fontRef>
+        </p:style>
+      </p:cxnSp>
+      <p:cxnSp>
+        <p:nvCxnSpPr>
+          <p:cNvPr id="50" name="Straight Connector 49"/>
+          <p:cNvCxnSpPr>
+            <a:stCxn id="18" idx="0"/>
+          </p:cNvCxnSpPr>
+          <p:nvPr/>
+        </p:nvCxnSpPr>
+        <p:spPr>
+          <a:xfrm flipV="1">
+            <a:off x="7093772" y="855233"/>
+            <a:ext cx="896" cy="433891"/>
+          </a:xfrm>
+          <a:prstGeom prst="line">
+            <a:avLst/>
+          </a:prstGeom>
+          <a:ln w="12700">
+            <a:solidFill>
+              <a:schemeClr val="tx1"/>
+            </a:solidFill>
+          </a:ln>
+        </p:spPr>
+        <p:style>
+          <a:lnRef idx="1">
+            <a:schemeClr val="accent1"/>
+          </a:lnRef>
+          <a:fillRef idx="0">
+            <a:schemeClr val="accent1"/>
+          </a:fillRef>
+          <a:effectRef idx="0">
+            <a:schemeClr val="accent1"/>
+          </a:effectRef>
+          <a:fontRef idx="minor">
+            <a:schemeClr val="tx1"/>
+          </a:fontRef>
+        </p:style>
+      </p:cxnSp>
+      <p:cxnSp>
+        <p:nvCxnSpPr>
+          <p:cNvPr id="52" name="Straight Connector 51"/>
+          <p:cNvCxnSpPr>
+            <a:stCxn id="16" idx="3"/>
+          </p:cNvCxnSpPr>
+          <p:nvPr/>
+        </p:nvCxnSpPr>
+        <p:spPr>
+          <a:xfrm flipV="1">
+            <a:off x="8050306" y="855233"/>
+            <a:ext cx="12550" cy="439270"/>
+          </a:xfrm>
+          <a:prstGeom prst="line">
+            <a:avLst/>
+          </a:prstGeom>
+          <a:ln w="12700">
+            <a:solidFill>
+              <a:schemeClr val="tx1"/>
+            </a:solidFill>
+          </a:ln>
+        </p:spPr>
+        <p:style>
+          <a:lnRef idx="1">
+            <a:schemeClr val="accent1"/>
+          </a:lnRef>
+          <a:fillRef idx="0">
+            <a:schemeClr val="accent1"/>
+          </a:fillRef>
+          <a:effectRef idx="0">
+            <a:schemeClr val="accent1"/>
+          </a:effectRef>
+          <a:fontRef idx="minor">
+            <a:schemeClr val="tx1"/>
+          </a:fontRef>
+        </p:style>
+      </p:cxnSp>
+      <p:sp>
+        <p:nvSpPr>
+          <p:cNvPr id="54" name="Rectangle 53"/>
+          <p:cNvSpPr/>
+          <p:nvPr/>
+        </p:nvSpPr>
+        <p:spPr>
+          <a:xfrm>
+            <a:off x="4621751" y="5540648"/>
+            <a:ext cx="441063" cy="441063"/>
+          </a:xfrm>
+          <a:prstGeom prst="rect">
+            <a:avLst/>
+          </a:prstGeom>
+          <a:solidFill>
+            <a:schemeClr val="bg1"/>
+          </a:solidFill>
+          <a:ln>
+            <a:solidFill>
+              <a:schemeClr val="tx1"/>
+            </a:solidFill>
+          </a:ln>
+        </p:spPr>
+        <p:style>
+          <a:lnRef idx="2">
+            <a:schemeClr val="accent1">
+              <a:shade val="50000"/>
+            </a:schemeClr>
+          </a:lnRef>
+          <a:fillRef idx="1">
+            <a:schemeClr val="accent1"/>
+          </a:fillRef>
+          <a:effectRef idx="0">
+            <a:schemeClr val="accent1"/>
+          </a:effectRef>
+          <a:fontRef idx="minor">
+            <a:schemeClr val="lt1"/>
+          </a:fontRef>
+        </p:style>
+        <p:txBody>
+          <a:bodyPr rtlCol="0" anchor="ctr"/>
+          <a:lstStyle/>
+          <a:p>
+            <a:pPr algn="ctr"/>
+            <a:r>
+              <a:rPr lang="en-US" dirty="0" smtClean="0">
+                <a:solidFill>
+                  <a:sysClr val="windowText" lastClr="000000"/>
+                </a:solidFill>
+              </a:rPr>
+              <a:t>x</a:t>
+            </a:r>
+            <a:endParaRPr lang="en-US" dirty="0">
+              <a:solidFill>
+                <a:sysClr val="windowText" lastClr="000000"/>
+              </a:solidFill>
+            </a:endParaRPr>
+          </a:p>
+        </p:txBody>
+      </p:sp>
+      <p:sp>
+        <p:nvSpPr>
+          <p:cNvPr id="55" name="Rectangle 54"/>
+          <p:cNvSpPr/>
+          <p:nvPr/>
+        </p:nvSpPr>
+        <p:spPr>
+          <a:xfrm>
+            <a:off x="4614358" y="4296326"/>
+            <a:ext cx="441063" cy="441063"/>
+          </a:xfrm>
+          <a:prstGeom prst="rect">
+            <a:avLst/>
+          </a:prstGeom>
+          <a:solidFill>
+            <a:schemeClr val="bg1"/>
+          </a:solidFill>
+          <a:ln>
+            <a:solidFill>
+              <a:schemeClr val="tx1"/>
+            </a:solidFill>
+          </a:ln>
+        </p:spPr>
+        <p:style>
+          <a:lnRef idx="2">
+            <a:schemeClr val="accent1">
+              <a:shade val="50000"/>
+            </a:schemeClr>
+          </a:lnRef>
+          <a:fillRef idx="1">
+            <a:schemeClr val="accent1"/>
+          </a:fillRef>
+          <a:effectRef idx="0">
+            <a:schemeClr val="accent1"/>
+          </a:effectRef>
+          <a:fontRef idx="minor">
+            <a:schemeClr val="lt1"/>
+          </a:fontRef>
+        </p:style>
+        <p:txBody>
+          <a:bodyPr rtlCol="0" anchor="ctr"/>
+          <a:lstStyle/>
+          <a:p>
+            <a:pPr algn="ctr"/>
+            <a:r>
+              <a:rPr lang="en-US" dirty="0" smtClean="0">
+                <a:solidFill>
+                  <a:sysClr val="windowText" lastClr="000000"/>
+                </a:solidFill>
+              </a:rPr>
+              <a:t>x</a:t>
+            </a:r>
+            <a:endParaRPr lang="en-US" dirty="0">
+              <a:solidFill>
+                <a:sysClr val="windowText" lastClr="000000"/>
+              </a:solidFill>
+            </a:endParaRPr>
+          </a:p>
+        </p:txBody>
+      </p:sp>
+      <p:cxnSp>
+        <p:nvCxnSpPr>
+          <p:cNvPr id="64" name="Straight Connector 63"/>
+          <p:cNvCxnSpPr>
+            <a:stCxn id="22" idx="6"/>
+          </p:cNvCxnSpPr>
+          <p:nvPr/>
+        </p:nvCxnSpPr>
+        <p:spPr>
+          <a:xfrm flipV="1">
+            <a:off x="5042645" y="2630245"/>
+            <a:ext cx="1524899" cy="8070"/>
+          </a:xfrm>
+          <a:prstGeom prst="line">
+            <a:avLst/>
+          </a:prstGeom>
+          <a:ln w="12700">
+            <a:solidFill>
+              <a:schemeClr val="tx1"/>
+            </a:solidFill>
+          </a:ln>
+        </p:spPr>
+        <p:style>
+          <a:lnRef idx="1">
+            <a:schemeClr val="accent1"/>
+          </a:lnRef>
+          <a:fillRef idx="0">
+            <a:schemeClr val="accent1"/>
+          </a:fillRef>
+          <a:effectRef idx="0">
+            <a:schemeClr val="accent1"/>
+          </a:effectRef>
+          <a:fontRef idx="minor">
+            <a:schemeClr val="tx1"/>
+          </a:fontRef>
+        </p:style>
+      </p:cxnSp>
+      <p:cxnSp>
+        <p:nvCxnSpPr>
+          <p:cNvPr id="66" name="Straight Connector 65"/>
+          <p:cNvCxnSpPr/>
+          <p:nvPr/>
+        </p:nvCxnSpPr>
+        <p:spPr>
+          <a:xfrm flipV="1">
+            <a:off x="6567544" y="1731980"/>
+            <a:ext cx="0" cy="898265"/>
+          </a:xfrm>
+          <a:prstGeom prst="line">
+            <a:avLst/>
+          </a:prstGeom>
+          <a:ln w="12700">
+            <a:solidFill>
+              <a:schemeClr val="tx1"/>
+            </a:solidFill>
+          </a:ln>
+        </p:spPr>
+        <p:style>
+          <a:lnRef idx="1">
+            <a:schemeClr val="accent1"/>
+          </a:lnRef>
+          <a:fillRef idx="0">
+            <a:schemeClr val="accent1"/>
+          </a:fillRef>
+          <a:effectRef idx="0">
+            <a:schemeClr val="accent1"/>
+          </a:effectRef>
+          <a:fontRef idx="minor">
+            <a:schemeClr val="tx1"/>
+          </a:fontRef>
+        </p:style>
+      </p:cxnSp>
+      <p:cxnSp>
+        <p:nvCxnSpPr>
+          <p:cNvPr id="68" name="Straight Connector 67"/>
+          <p:cNvCxnSpPr>
+            <a:stCxn id="22" idx="2"/>
+          </p:cNvCxnSpPr>
+          <p:nvPr/>
+        </p:nvCxnSpPr>
+        <p:spPr>
+          <a:xfrm flipH="1">
+            <a:off x="3861995" y="2638315"/>
+            <a:ext cx="766481" cy="0"/>
+          </a:xfrm>
+          <a:prstGeom prst="line">
+            <a:avLst/>
+          </a:prstGeom>
+          <a:ln w="12700">
+            <a:solidFill>
+              <a:schemeClr val="tx1"/>
+            </a:solidFill>
+          </a:ln>
+        </p:spPr>
+        <p:style>
+          <a:lnRef idx="1">
+            <a:schemeClr val="accent1"/>
+          </a:lnRef>
+          <a:fillRef idx="0">
+            <a:schemeClr val="accent1"/>
+          </a:fillRef>
+          <a:effectRef idx="0">
+            <a:schemeClr val="accent1"/>
+          </a:effectRef>
+          <a:fontRef idx="minor">
+            <a:schemeClr val="tx1"/>
+          </a:fontRef>
+        </p:style>
+      </p:cxnSp>
+      <p:cxnSp>
+        <p:nvCxnSpPr>
+          <p:cNvPr id="70" name="Straight Connector 69"/>
+          <p:cNvCxnSpPr/>
+          <p:nvPr/>
+        </p:nvCxnSpPr>
+        <p:spPr>
+          <a:xfrm flipV="1">
+            <a:off x="3867374" y="1731980"/>
+            <a:ext cx="0" cy="906335"/>
+          </a:xfrm>
+          <a:prstGeom prst="line">
+            <a:avLst/>
+          </a:prstGeom>
+          <a:ln w="12700">
+            <a:solidFill>
+              <a:schemeClr val="tx1"/>
+            </a:solidFill>
+          </a:ln>
+        </p:spPr>
+        <p:style>
+          <a:lnRef idx="1">
+            <a:schemeClr val="accent1"/>
+          </a:lnRef>
+          <a:fillRef idx="0">
+            <a:schemeClr val="accent1"/>
+          </a:fillRef>
+          <a:effectRef idx="0">
+            <a:schemeClr val="accent1"/>
+          </a:effectRef>
+          <a:fontRef idx="minor">
+            <a:schemeClr val="tx1"/>
+          </a:fontRef>
+        </p:style>
+      </p:cxnSp>
+      <p:cxnSp>
+        <p:nvCxnSpPr>
+          <p:cNvPr id="72" name="Straight Connector 71"/>
+          <p:cNvCxnSpPr>
+            <a:stCxn id="39" idx="6"/>
+          </p:cNvCxnSpPr>
+          <p:nvPr/>
+        </p:nvCxnSpPr>
+        <p:spPr>
+          <a:xfrm flipV="1">
+            <a:off x="5042644" y="3921162"/>
+            <a:ext cx="2525361" cy="5399"/>
+          </a:xfrm>
+          <a:prstGeom prst="line">
+            <a:avLst/>
+          </a:prstGeom>
+          <a:ln w="12700">
+            <a:solidFill>
+              <a:schemeClr val="tx1"/>
+            </a:solidFill>
+          </a:ln>
+        </p:spPr>
+        <p:style>
+          <a:lnRef idx="1">
+            <a:schemeClr val="accent1"/>
+          </a:lnRef>
+          <a:fillRef idx="0">
+            <a:schemeClr val="accent1"/>
+          </a:fillRef>
+          <a:effectRef idx="0">
+            <a:schemeClr val="accent1"/>
+          </a:effectRef>
+          <a:fontRef idx="minor">
+            <a:schemeClr val="tx1"/>
+          </a:fontRef>
+        </p:style>
+      </p:cxnSp>
+      <p:cxnSp>
+        <p:nvCxnSpPr>
+          <p:cNvPr id="74" name="Straight Connector 73"/>
+          <p:cNvCxnSpPr/>
+          <p:nvPr/>
+        </p:nvCxnSpPr>
+        <p:spPr>
+          <a:xfrm flipV="1">
+            <a:off x="7578762" y="1731980"/>
+            <a:ext cx="0" cy="2194580"/>
+          </a:xfrm>
+          <a:prstGeom prst="line">
+            <a:avLst/>
+          </a:prstGeom>
+          <a:ln w="12700">
+            <a:solidFill>
+              <a:schemeClr val="tx1"/>
+            </a:solidFill>
+          </a:ln>
+        </p:spPr>
+        <p:style>
+          <a:lnRef idx="1">
+            <a:schemeClr val="accent1"/>
+          </a:lnRef>
+          <a:fillRef idx="0">
+            <a:schemeClr val="accent1"/>
+          </a:fillRef>
+          <a:effectRef idx="0">
+            <a:schemeClr val="accent1"/>
+          </a:effectRef>
+          <a:fontRef idx="minor">
+            <a:schemeClr val="tx1"/>
+          </a:fontRef>
+        </p:style>
+      </p:cxnSp>
+      <p:cxnSp>
+        <p:nvCxnSpPr>
+          <p:cNvPr id="77" name="Straight Connector 76"/>
+          <p:cNvCxnSpPr>
+            <a:stCxn id="39" idx="2"/>
+          </p:cNvCxnSpPr>
+          <p:nvPr/>
+        </p:nvCxnSpPr>
+        <p:spPr>
+          <a:xfrm flipH="1" flipV="1">
+            <a:off x="2926080" y="3921162"/>
+            <a:ext cx="1702395" cy="5399"/>
+          </a:xfrm>
+          <a:prstGeom prst="line">
+            <a:avLst/>
+          </a:prstGeom>
+          <a:ln w="12700">
+            <a:solidFill>
+              <a:schemeClr val="tx1"/>
+            </a:solidFill>
+          </a:ln>
+        </p:spPr>
+        <p:style>
+          <a:lnRef idx="1">
+            <a:schemeClr val="accent1"/>
+          </a:lnRef>
+          <a:fillRef idx="0">
+            <a:schemeClr val="accent1"/>
+          </a:fillRef>
+          <a:effectRef idx="0">
+            <a:schemeClr val="accent1"/>
+          </a:effectRef>
+          <a:fontRef idx="minor">
+            <a:schemeClr val="tx1"/>
+          </a:fontRef>
+        </p:style>
+      </p:cxnSp>
+      <p:cxnSp>
+        <p:nvCxnSpPr>
+          <p:cNvPr id="79" name="Straight Connector 78"/>
+          <p:cNvCxnSpPr/>
+          <p:nvPr/>
+        </p:nvCxnSpPr>
+        <p:spPr>
+          <a:xfrm flipV="1">
+            <a:off x="2923388" y="1735557"/>
+            <a:ext cx="0" cy="2185605"/>
+          </a:xfrm>
+          <a:prstGeom prst="line">
+            <a:avLst/>
+          </a:prstGeom>
+          <a:ln w="12700">
+            <a:solidFill>
+              <a:schemeClr val="tx1"/>
+            </a:solidFill>
+          </a:ln>
+        </p:spPr>
+        <p:style>
+          <a:lnRef idx="1">
+            <a:schemeClr val="accent1"/>
+          </a:lnRef>
+          <a:fillRef idx="0">
+            <a:schemeClr val="accent1"/>
+          </a:fillRef>
+          <a:effectRef idx="0">
+            <a:schemeClr val="accent1"/>
+          </a:effectRef>
+          <a:fontRef idx="minor">
+            <a:schemeClr val="tx1"/>
+          </a:fontRef>
+        </p:style>
+      </p:cxnSp>
+      <p:cxnSp>
+        <p:nvCxnSpPr>
+          <p:cNvPr id="81" name="Straight Connector 80"/>
+          <p:cNvCxnSpPr>
+            <a:stCxn id="15" idx="3"/>
+          </p:cNvCxnSpPr>
+          <p:nvPr/>
+        </p:nvCxnSpPr>
+        <p:spPr>
+          <a:xfrm flipV="1">
+            <a:off x="8265460" y="1731980"/>
+            <a:ext cx="432098" cy="6276"/>
+          </a:xfrm>
+          <a:prstGeom prst="line">
+            <a:avLst/>
+          </a:prstGeom>
+          <a:ln w="12700">
+            <a:solidFill>
+              <a:schemeClr val="tx1"/>
+            </a:solidFill>
+          </a:ln>
+        </p:spPr>
+        <p:style>
+          <a:lnRef idx="1">
+            <a:schemeClr val="accent1"/>
+          </a:lnRef>
+          <a:fillRef idx="0">
+            <a:schemeClr val="accent1"/>
+          </a:fillRef>
+          <a:effectRef idx="0">
+            <a:schemeClr val="accent1"/>
+          </a:effectRef>
+          <a:fontRef idx="minor">
+            <a:schemeClr val="tx1"/>
+          </a:fontRef>
+        </p:style>
+      </p:cxnSp>
+      <p:cxnSp>
+        <p:nvCxnSpPr>
+          <p:cNvPr id="83" name="Straight Connector 82"/>
+          <p:cNvCxnSpPr>
+            <a:stCxn id="38" idx="6"/>
+          </p:cNvCxnSpPr>
+          <p:nvPr/>
+        </p:nvCxnSpPr>
+        <p:spPr>
+          <a:xfrm>
+            <a:off x="5056090" y="5107193"/>
+            <a:ext cx="3641468" cy="8068"/>
+          </a:xfrm>
+          <a:prstGeom prst="line">
+            <a:avLst/>
+          </a:prstGeom>
+          <a:ln w="12700">
+            <a:solidFill>
+              <a:schemeClr val="tx1"/>
+            </a:solidFill>
+          </a:ln>
+        </p:spPr>
+        <p:style>
+          <a:lnRef idx="1">
+            <a:schemeClr val="accent1"/>
+          </a:lnRef>
+          <a:fillRef idx="0">
+            <a:schemeClr val="accent1"/>
+          </a:fillRef>
+          <a:effectRef idx="0">
+            <a:schemeClr val="accent1"/>
+          </a:effectRef>
+          <a:fontRef idx="minor">
+            <a:schemeClr val="tx1"/>
+          </a:fontRef>
+        </p:style>
+      </p:cxnSp>
+      <p:cxnSp>
+        <p:nvCxnSpPr>
+          <p:cNvPr id="85" name="Straight Connector 84"/>
+          <p:cNvCxnSpPr/>
+          <p:nvPr/>
+        </p:nvCxnSpPr>
+        <p:spPr>
+          <a:xfrm flipV="1">
+            <a:off x="8697558" y="1731980"/>
+            <a:ext cx="0" cy="3375213"/>
+          </a:xfrm>
+          <a:prstGeom prst="line">
+            <a:avLst/>
+          </a:prstGeom>
+          <a:ln w="12700">
+            <a:solidFill>
+              <a:schemeClr val="tx1"/>
+            </a:solidFill>
+          </a:ln>
+        </p:spPr>
+        <p:style>
+          <a:lnRef idx="1">
+            <a:schemeClr val="accent1"/>
+          </a:lnRef>
+          <a:fillRef idx="0">
+            <a:schemeClr val="accent1"/>
+          </a:fillRef>
+          <a:effectRef idx="0">
+            <a:schemeClr val="accent1"/>
+          </a:effectRef>
+          <a:fontRef idx="minor">
+            <a:schemeClr val="tx1"/>
+          </a:fontRef>
+        </p:style>
+      </p:cxnSp>
+      <p:cxnSp>
+        <p:nvCxnSpPr>
+          <p:cNvPr id="89" name="Straight Connector 88"/>
+          <p:cNvCxnSpPr>
+            <a:stCxn id="38" idx="2"/>
+          </p:cNvCxnSpPr>
+          <p:nvPr/>
+        </p:nvCxnSpPr>
+        <p:spPr>
+          <a:xfrm flipH="1">
+            <a:off x="1854345" y="5107193"/>
+            <a:ext cx="2787576" cy="0"/>
+          </a:xfrm>
+          <a:prstGeom prst="line">
+            <a:avLst/>
+          </a:prstGeom>
+          <a:ln w="12700">
+            <a:solidFill>
+              <a:schemeClr val="tx1"/>
+            </a:solidFill>
+          </a:ln>
+        </p:spPr>
+        <p:style>
+          <a:lnRef idx="1">
+            <a:schemeClr val="accent1"/>
+          </a:lnRef>
+          <a:fillRef idx="0">
+            <a:schemeClr val="accent1"/>
+          </a:fillRef>
+          <a:effectRef idx="0">
+            <a:schemeClr val="accent1"/>
+          </a:effectRef>
+          <a:fontRef idx="minor">
+            <a:schemeClr val="tx1"/>
+          </a:fontRef>
+        </p:style>
+      </p:cxnSp>
+      <p:cxnSp>
+        <p:nvCxnSpPr>
+          <p:cNvPr id="91" name="Straight Connector 90"/>
+          <p:cNvCxnSpPr/>
+          <p:nvPr/>
+        </p:nvCxnSpPr>
+        <p:spPr>
+          <a:xfrm flipV="1">
+            <a:off x="1854346" y="1723463"/>
+            <a:ext cx="0" cy="3391798"/>
+          </a:xfrm>
+          <a:prstGeom prst="line">
+            <a:avLst/>
+          </a:prstGeom>
+          <a:ln w="12700">
+            <a:solidFill>
+              <a:schemeClr val="tx1"/>
+            </a:solidFill>
+          </a:ln>
+        </p:spPr>
+        <p:style>
+          <a:lnRef idx="1">
+            <a:schemeClr val="accent1"/>
+          </a:lnRef>
+          <a:fillRef idx="0">
+            <a:schemeClr val="accent1"/>
+          </a:fillRef>
+          <a:effectRef idx="0">
+            <a:schemeClr val="accent1"/>
+          </a:effectRef>
+          <a:fontRef idx="minor">
+            <a:schemeClr val="tx1"/>
+          </a:fontRef>
+        </p:style>
+      </p:cxnSp>
+      <p:cxnSp>
+        <p:nvCxnSpPr>
+          <p:cNvPr id="96" name="Straight Connector 95"/>
+          <p:cNvCxnSpPr>
+            <a:stCxn id="22" idx="4"/>
+            <a:endCxn id="23" idx="0"/>
+          </p:cNvCxnSpPr>
+          <p:nvPr/>
+        </p:nvCxnSpPr>
+        <p:spPr>
+          <a:xfrm flipH="1">
+            <a:off x="4835559" y="2845399"/>
+            <a:ext cx="2" cy="216507"/>
+          </a:xfrm>
+          <a:prstGeom prst="line">
+            <a:avLst/>
+          </a:prstGeom>
+          <a:ln w="12700">
+            <a:solidFill>
+              <a:schemeClr val="tx1"/>
+            </a:solidFill>
+          </a:ln>
+        </p:spPr>
+        <p:style>
+          <a:lnRef idx="1">
+            <a:schemeClr val="accent1"/>
+          </a:lnRef>
+          <a:fillRef idx="0">
+            <a:schemeClr val="accent1"/>
+          </a:fillRef>
+          <a:effectRef idx="0">
+            <a:schemeClr val="accent1"/>
+          </a:effectRef>
+          <a:fontRef idx="minor">
+            <a:schemeClr val="tx1"/>
+          </a:fontRef>
+        </p:style>
+      </p:cxnSp>
+      <p:cxnSp>
+        <p:nvCxnSpPr>
+          <p:cNvPr id="100" name="Straight Connector 99"/>
+          <p:cNvCxnSpPr>
+            <a:stCxn id="39" idx="4"/>
+            <a:endCxn id="55" idx="0"/>
+          </p:cNvCxnSpPr>
+          <p:nvPr/>
+        </p:nvCxnSpPr>
+        <p:spPr>
+          <a:xfrm flipH="1">
+            <a:off x="4834890" y="4133645"/>
+            <a:ext cx="670" cy="162681"/>
+          </a:xfrm>
+          <a:prstGeom prst="line">
+            <a:avLst/>
+          </a:prstGeom>
+          <a:ln w="12700">
+            <a:solidFill>
+              <a:schemeClr val="tx1"/>
+            </a:solidFill>
+          </a:ln>
+        </p:spPr>
+        <p:style>
+          <a:lnRef idx="1">
+            <a:schemeClr val="accent1"/>
+          </a:lnRef>
+          <a:fillRef idx="0">
+            <a:schemeClr val="accent1"/>
+          </a:fillRef>
+          <a:effectRef idx="0">
+            <a:schemeClr val="accent1"/>
+          </a:effectRef>
+          <a:fontRef idx="minor">
+            <a:schemeClr val="tx1"/>
+          </a:fontRef>
+        </p:style>
+      </p:cxnSp>
+      <p:cxnSp>
+        <p:nvCxnSpPr>
+          <p:cNvPr id="102" name="Straight Connector 101"/>
+          <p:cNvCxnSpPr>
+            <a:stCxn id="38" idx="4"/>
+            <a:endCxn id="54" idx="0"/>
+          </p:cNvCxnSpPr>
+          <p:nvPr/>
+        </p:nvCxnSpPr>
+        <p:spPr>
+          <a:xfrm flipH="1">
+            <a:off x="4842283" y="5314277"/>
+            <a:ext cx="6723" cy="226371"/>
+          </a:xfrm>
+          <a:prstGeom prst="line">
+            <a:avLst/>
+          </a:prstGeom>
+          <a:ln w="12700">
+            <a:solidFill>
+              <a:schemeClr val="tx1"/>
+            </a:solidFill>
+          </a:ln>
+        </p:spPr>
+        <p:style>
+          <a:lnRef idx="1">
+            <a:schemeClr val="accent1"/>
+          </a:lnRef>
+          <a:fillRef idx="0">
+            <a:schemeClr val="accent1"/>
+          </a:fillRef>
+          <a:effectRef idx="0">
+            <a:schemeClr val="accent1"/>
+          </a:effectRef>
+          <a:fontRef idx="minor">
+            <a:schemeClr val="tx1"/>
+          </a:fontRef>
+        </p:style>
+      </p:cxnSp>
+      <p:cxnSp>
+        <p:nvCxnSpPr>
+          <p:cNvPr id="107" name="Straight Connector 106"/>
+          <p:cNvCxnSpPr>
+            <a:stCxn id="23" idx="1"/>
+          </p:cNvCxnSpPr>
+          <p:nvPr/>
+        </p:nvCxnSpPr>
+        <p:spPr>
+          <a:xfrm flipH="1" flipV="1">
+            <a:off x="4297680" y="3282437"/>
+            <a:ext cx="317347" cy="1"/>
+          </a:xfrm>
+          <a:prstGeom prst="line">
+            <a:avLst/>
+          </a:prstGeom>
+          <a:ln w="12700">
+            <a:solidFill>
+              <a:schemeClr val="tx1"/>
+            </a:solidFill>
+          </a:ln>
+        </p:spPr>
+        <p:style>
+          <a:lnRef idx="1">
+            <a:schemeClr val="accent1"/>
+          </a:lnRef>
+          <a:fillRef idx="0">
+            <a:schemeClr val="accent1"/>
+          </a:fillRef>
+          <a:effectRef idx="0">
+            <a:schemeClr val="accent1"/>
+          </a:effectRef>
+          <a:fontRef idx="minor">
+            <a:schemeClr val="tx1"/>
+          </a:fontRef>
+        </p:style>
+      </p:cxnSp>
+      <p:cxnSp>
+        <p:nvCxnSpPr>
+          <p:cNvPr id="109" name="Straight Connector 108"/>
+          <p:cNvCxnSpPr>
+            <a:stCxn id="55" idx="1"/>
+          </p:cNvCxnSpPr>
+          <p:nvPr/>
+        </p:nvCxnSpPr>
+        <p:spPr>
+          <a:xfrm flipH="1">
+            <a:off x="4245235" y="4516858"/>
+            <a:ext cx="369123" cy="0"/>
+          </a:xfrm>
+          <a:prstGeom prst="line">
+            <a:avLst/>
+          </a:prstGeom>
+          <a:ln w="12700">
+            <a:solidFill>
+              <a:schemeClr val="tx1"/>
+            </a:solidFill>
+          </a:ln>
+        </p:spPr>
+        <p:style>
+          <a:lnRef idx="1">
+            <a:schemeClr val="accent1"/>
+          </a:lnRef>
+          <a:fillRef idx="0">
+            <a:schemeClr val="accent1"/>
+          </a:fillRef>
+          <a:effectRef idx="0">
+            <a:schemeClr val="accent1"/>
+          </a:effectRef>
+          <a:fontRef idx="minor">
+            <a:schemeClr val="tx1"/>
+          </a:fontRef>
+        </p:style>
+      </p:cxnSp>
+      <p:cxnSp>
+        <p:nvCxnSpPr>
+          <p:cNvPr id="111" name="Straight Connector 110"/>
+          <p:cNvCxnSpPr>
+            <a:stCxn id="54" idx="1"/>
+          </p:cNvCxnSpPr>
+          <p:nvPr/>
+        </p:nvCxnSpPr>
+        <p:spPr>
+          <a:xfrm flipH="1">
+            <a:off x="4245235" y="5761180"/>
+            <a:ext cx="376516" cy="0"/>
+          </a:xfrm>
+          <a:prstGeom prst="line">
+            <a:avLst/>
+          </a:prstGeom>
+          <a:ln w="12700">
+            <a:solidFill>
+              <a:schemeClr val="tx1"/>
+            </a:solidFill>
+          </a:ln>
+        </p:spPr>
+        <p:style>
+          <a:lnRef idx="1">
+            <a:schemeClr val="accent1"/>
+          </a:lnRef>
+          <a:fillRef idx="0">
+            <a:schemeClr val="accent1"/>
+          </a:fillRef>
+          <a:effectRef idx="0">
+            <a:schemeClr val="accent1"/>
+          </a:effectRef>
+          <a:fontRef idx="minor">
+            <a:schemeClr val="tx1"/>
+          </a:fontRef>
+        </p:style>
+      </p:cxnSp>
+      <mc:AlternateContent xmlns:mc="http://schemas.openxmlformats.org/markup-compatibility/2006">
+        <mc:Choice xmlns:a14="http://schemas.microsoft.com/office/drawing/2010/main" Requires="a14">
+          <p:sp>
+            <p:nvSpPr>
+              <p:cNvPr id="115" name="TextBox 114"/>
+              <p:cNvSpPr txBox="1"/>
+              <p:nvPr/>
+            </p:nvSpPr>
+            <p:spPr>
+              <a:xfrm>
+                <a:off x="3898751" y="3056509"/>
+                <a:ext cx="182880" cy="369332"/>
+              </a:xfrm>
+              <a:prstGeom prst="rect">
+                <a:avLst/>
+              </a:prstGeom>
+              <a:noFill/>
+            </p:spPr>
+            <p:txBody>
+              <a:bodyPr wrap="square" rtlCol="0">
+                <a:spAutoFit/>
+              </a:bodyPr>
+              <a:lstStyle/>
+              <a:p>
+                <a14:m>
+                  <m:oMathPara xmlns:m="http://schemas.openxmlformats.org/officeDocument/2006/math">
+                    <m:oMathParaPr>
+                      <m:jc m:val="centerGroup"/>
+                    </m:oMathParaPr>
+                    <m:oMath xmlns:m="http://schemas.openxmlformats.org/officeDocument/2006/math">
+                      <m:sSub>
+                        <m:sSubPr>
+                          <m:ctrlPr>
+                            <a:rPr lang="en-US" b="0" i="1" smtClean="0">
+                              <a:latin typeface="Cambria Math" panose="02040503050406030204" pitchFamily="18" charset="0"/>
+                            </a:rPr>
+                          </m:ctrlPr>
+                        </m:sSubPr>
+                        <m:e>
+                          <m:r>
+                            <a:rPr lang="en-US" b="0" i="1" smtClean="0">
+                              <a:latin typeface="Cambria Math" panose="02040503050406030204" pitchFamily="18" charset="0"/>
+                            </a:rPr>
+                            <m:t>𝑎</m:t>
+                          </m:r>
+                        </m:e>
+                        <m:sub>
+                          <m:r>
+                            <a:rPr lang="en-US" b="0" i="1" smtClean="0">
+                              <a:latin typeface="Cambria Math" panose="02040503050406030204" pitchFamily="18" charset="0"/>
+                            </a:rPr>
+                            <m:t>2</m:t>
+                          </m:r>
+                        </m:sub>
+                      </m:sSub>
+                    </m:oMath>
+                  </m:oMathPara>
+                </a14:m>
+                <a:endParaRPr lang="en-US" dirty="0"/>
+              </a:p>
+            </p:txBody>
+          </p:sp>
+        </mc:Choice>
+        <mc:Fallback>
+          <p:sp>
+            <p:nvSpPr>
+              <p:cNvPr id="115" name="TextBox 114"/>
+              <p:cNvSpPr txBox="1">
+                <a:spLocks noRot="1" noChangeAspect="1" noMove="1" noResize="1" noEditPoints="1" noAdjustHandles="1" noChangeArrowheads="1" noChangeShapeType="1" noTextEdit="1"/>
+              </p:cNvSpPr>
+              <p:nvPr/>
+            </p:nvSpPr>
+            <p:spPr>
+              <a:xfrm>
+                <a:off x="3898751" y="3056509"/>
+                <a:ext cx="182880" cy="369332"/>
+              </a:xfrm>
+              <a:prstGeom prst="rect">
+                <a:avLst/>
+              </a:prstGeom>
+              <a:blipFill rotWithShape="0">
+                <a:blip r:embed="rId2"/>
+                <a:stretch>
+                  <a:fillRect r="-103333"/>
+                </a:stretch>
+              </a:blipFill>
+            </p:spPr>
+            <p:txBody>
+              <a:bodyPr/>
+              <a:lstStyle/>
+              <a:p>
+                <a:r>
+                  <a:rPr lang="en-US">
+                    <a:noFill/>
+                  </a:rPr>
+                  <a:t> </a:t>
+                </a:r>
+              </a:p>
+            </p:txBody>
+          </p:sp>
+        </mc:Fallback>
+      </mc:AlternateContent>
+      <mc:AlternateContent xmlns:mc="http://schemas.openxmlformats.org/markup-compatibility/2006">
+        <mc:Choice xmlns:a14="http://schemas.microsoft.com/office/drawing/2010/main" Requires="a14">
+          <p:sp>
+            <p:nvSpPr>
+              <p:cNvPr id="116" name="TextBox 115"/>
+              <p:cNvSpPr txBox="1"/>
+              <p:nvPr/>
+            </p:nvSpPr>
+            <p:spPr>
+              <a:xfrm>
+                <a:off x="3841820" y="4268541"/>
+                <a:ext cx="182880" cy="369332"/>
+              </a:xfrm>
+              <a:prstGeom prst="rect">
+                <a:avLst/>
+              </a:prstGeom>
+              <a:noFill/>
+            </p:spPr>
+            <p:txBody>
+              <a:bodyPr wrap="square" rtlCol="0">
+                <a:spAutoFit/>
+              </a:bodyPr>
+              <a:lstStyle/>
+              <a:p>
+                <a14:m>
+                  <m:oMathPara xmlns:m="http://schemas.openxmlformats.org/officeDocument/2006/math">
+                    <m:oMathParaPr>
+                      <m:jc m:val="centerGroup"/>
+                    </m:oMathParaPr>
+                    <m:oMath xmlns:m="http://schemas.openxmlformats.org/officeDocument/2006/math">
+                      <m:sSub>
+                        <m:sSubPr>
+                          <m:ctrlPr>
+                            <a:rPr lang="en-US" b="0" i="1" smtClean="0">
+                              <a:latin typeface="Cambria Math" panose="02040503050406030204" pitchFamily="18" charset="0"/>
+                            </a:rPr>
+                          </m:ctrlPr>
+                        </m:sSubPr>
+                        <m:e>
+                          <m:r>
+                            <a:rPr lang="en-US" b="0" i="1" smtClean="0">
+                              <a:latin typeface="Cambria Math" panose="02040503050406030204" pitchFamily="18" charset="0"/>
+                            </a:rPr>
+                            <m:t>𝑎</m:t>
+                          </m:r>
+                        </m:e>
+                        <m:sub>
+                          <m:r>
+                            <a:rPr lang="en-US" b="0" i="1" smtClean="0">
+                              <a:latin typeface="Cambria Math" panose="02040503050406030204" pitchFamily="18" charset="0"/>
+                            </a:rPr>
+                            <m:t>1</m:t>
+                          </m:r>
+                        </m:sub>
+                      </m:sSub>
+                    </m:oMath>
+                  </m:oMathPara>
+                </a14:m>
+                <a:endParaRPr lang="en-US" dirty="0"/>
+              </a:p>
+            </p:txBody>
+          </p:sp>
+        </mc:Choice>
+        <mc:Fallback>
+          <p:sp>
+            <p:nvSpPr>
+              <p:cNvPr id="116" name="TextBox 115"/>
+              <p:cNvSpPr txBox="1">
+                <a:spLocks noRot="1" noChangeAspect="1" noMove="1" noResize="1" noEditPoints="1" noAdjustHandles="1" noChangeArrowheads="1" noChangeShapeType="1" noTextEdit="1"/>
+              </p:cNvSpPr>
+              <p:nvPr/>
+            </p:nvSpPr>
+            <p:spPr>
+              <a:xfrm>
+                <a:off x="3841820" y="4268541"/>
+                <a:ext cx="182880" cy="369332"/>
+              </a:xfrm>
+              <a:prstGeom prst="rect">
+                <a:avLst/>
+              </a:prstGeom>
+              <a:blipFill rotWithShape="0">
+                <a:blip r:embed="rId3"/>
+                <a:stretch>
+                  <a:fillRect r="-103333"/>
+                </a:stretch>
+              </a:blipFill>
+            </p:spPr>
+            <p:txBody>
+              <a:bodyPr/>
+              <a:lstStyle/>
+              <a:p>
+                <a:r>
+                  <a:rPr lang="en-US">
+                    <a:noFill/>
+                  </a:rPr>
+                  <a:t> </a:t>
+                </a:r>
+              </a:p>
+            </p:txBody>
+          </p:sp>
+        </mc:Fallback>
+      </mc:AlternateContent>
+      <mc:AlternateContent xmlns:mc="http://schemas.openxmlformats.org/markup-compatibility/2006">
+        <mc:Choice xmlns:a14="http://schemas.microsoft.com/office/drawing/2010/main" Requires="a14">
+          <p:sp>
+            <p:nvSpPr>
+              <p:cNvPr id="117" name="TextBox 116"/>
+              <p:cNvSpPr txBox="1"/>
+              <p:nvPr/>
+            </p:nvSpPr>
+            <p:spPr>
+              <a:xfrm>
+                <a:off x="3839128" y="5512862"/>
+                <a:ext cx="182880" cy="369332"/>
+              </a:xfrm>
+              <a:prstGeom prst="rect">
+                <a:avLst/>
+              </a:prstGeom>
+              <a:noFill/>
+            </p:spPr>
+            <p:txBody>
+              <a:bodyPr wrap="square" rtlCol="0">
+                <a:spAutoFit/>
+              </a:bodyPr>
+              <a:lstStyle/>
+              <a:p>
+                <a14:m>
+                  <m:oMathPara xmlns:m="http://schemas.openxmlformats.org/officeDocument/2006/math">
+                    <m:oMathParaPr>
+                      <m:jc m:val="centerGroup"/>
+                    </m:oMathParaPr>
+                    <m:oMath xmlns:m="http://schemas.openxmlformats.org/officeDocument/2006/math">
+                      <m:sSub>
+                        <m:sSubPr>
+                          <m:ctrlPr>
+                            <a:rPr lang="en-US" b="0" i="1" smtClean="0">
+                              <a:latin typeface="Cambria Math" panose="02040503050406030204" pitchFamily="18" charset="0"/>
+                            </a:rPr>
+                          </m:ctrlPr>
+                        </m:sSubPr>
+                        <m:e>
+                          <m:r>
+                            <a:rPr lang="en-US" b="0" i="1" smtClean="0">
+                              <a:latin typeface="Cambria Math" panose="02040503050406030204" pitchFamily="18" charset="0"/>
+                            </a:rPr>
+                            <m:t>𝑎</m:t>
+                          </m:r>
+                        </m:e>
+                        <m:sub>
+                          <m:r>
+                            <a:rPr lang="en-US" b="0" i="1" smtClean="0">
+                              <a:latin typeface="Cambria Math" panose="02040503050406030204" pitchFamily="18" charset="0"/>
+                            </a:rPr>
+                            <m:t>0</m:t>
+                          </m:r>
+                        </m:sub>
+                      </m:sSub>
+                    </m:oMath>
+                  </m:oMathPara>
+                </a14:m>
+                <a:endParaRPr lang="en-US" dirty="0"/>
+              </a:p>
+            </p:txBody>
+          </p:sp>
+        </mc:Choice>
+        <mc:Fallback>
+          <p:sp>
+            <p:nvSpPr>
+              <p:cNvPr id="117" name="TextBox 116"/>
+              <p:cNvSpPr txBox="1">
+                <a:spLocks noRot="1" noChangeAspect="1" noMove="1" noResize="1" noEditPoints="1" noAdjustHandles="1" noChangeArrowheads="1" noChangeShapeType="1" noTextEdit="1"/>
+              </p:cNvSpPr>
+              <p:nvPr/>
+            </p:nvSpPr>
+            <p:spPr>
+              <a:xfrm>
+                <a:off x="3839128" y="5512862"/>
+                <a:ext cx="182880" cy="369332"/>
+              </a:xfrm>
+              <a:prstGeom prst="rect">
+                <a:avLst/>
+              </a:prstGeom>
+              <a:blipFill rotWithShape="0">
+                <a:blip r:embed="rId4"/>
+                <a:stretch>
+                  <a:fillRect r="-103333"/>
+                </a:stretch>
+              </a:blipFill>
+            </p:spPr>
+            <p:txBody>
+              <a:bodyPr/>
+              <a:lstStyle/>
+              <a:p>
+                <a:r>
+                  <a:rPr lang="en-US">
+                    <a:noFill/>
+                  </a:rPr>
+                  <a:t> </a:t>
+                </a:r>
+              </a:p>
+            </p:txBody>
+          </p:sp>
+        </mc:Fallback>
+      </mc:AlternateContent>
+      <p:sp>
+        <p:nvSpPr>
+          <p:cNvPr id="118" name="Rectangle 117"/>
+          <p:cNvSpPr/>
+          <p:nvPr/>
+        </p:nvSpPr>
+        <p:spPr>
+          <a:xfrm>
+            <a:off x="9215719" y="3108960"/>
+            <a:ext cx="570155" cy="2872751"/>
+          </a:xfrm>
+          <a:prstGeom prst="rect">
+            <a:avLst/>
+          </a:prstGeom>
+          <a:solidFill>
+            <a:schemeClr val="bg1"/>
+          </a:solidFill>
+          <a:ln>
+            <a:solidFill>
+              <a:schemeClr val="tx1"/>
+            </a:solidFill>
+          </a:ln>
+        </p:spPr>
+        <p:style>
+          <a:lnRef idx="2">
+            <a:schemeClr val="accent1">
+              <a:shade val="50000"/>
+            </a:schemeClr>
+          </a:lnRef>
+          <a:fillRef idx="1">
+            <a:schemeClr val="accent1"/>
+          </a:fillRef>
+          <a:effectRef idx="0">
+            <a:schemeClr val="accent1"/>
+          </a:effectRef>
+          <a:fontRef idx="minor">
+            <a:schemeClr val="lt1"/>
+          </a:fontRef>
+        </p:style>
+        <p:txBody>
+          <a:bodyPr rtlCol="0" anchor="ctr"/>
+          <a:lstStyle/>
+          <a:p>
+            <a:pPr algn="ctr"/>
+            <a:r>
+              <a:rPr lang="en-US" dirty="0" smtClean="0">
+                <a:solidFill>
+                  <a:schemeClr val="tx1"/>
+                </a:solidFill>
+              </a:rPr>
+              <a:t>.</a:t>
+            </a:r>
+          </a:p>
+          <a:p>
+            <a:pPr algn="ctr"/>
+            <a:r>
+              <a:rPr lang="en-US" dirty="0" smtClean="0">
+                <a:solidFill>
+                  <a:schemeClr val="tx1"/>
+                </a:solidFill>
+              </a:rPr>
+              <a:t>.</a:t>
+            </a:r>
+          </a:p>
+          <a:p>
+            <a:pPr algn="ctr"/>
+            <a:r>
+              <a:rPr lang="en-US" dirty="0" smtClean="0">
+                <a:solidFill>
+                  <a:schemeClr val="tx1"/>
+                </a:solidFill>
+              </a:rPr>
+              <a:t>.</a:t>
+            </a:r>
+          </a:p>
+          <a:p>
+            <a:pPr algn="ctr"/>
+            <a:endParaRPr lang="en-US" dirty="0" smtClean="0">
+              <a:solidFill>
+                <a:schemeClr val="tx1"/>
+              </a:solidFill>
+            </a:endParaRPr>
+          </a:p>
+          <a:p>
+            <a:pPr algn="ctr"/>
+            <a:r>
+              <a:rPr lang="en-US" dirty="0" smtClean="0">
+                <a:solidFill>
+                  <a:schemeClr val="tx1"/>
+                </a:solidFill>
+              </a:rPr>
+              <a:t>+</a:t>
+            </a:r>
+          </a:p>
+          <a:p>
+            <a:pPr algn="ctr"/>
+            <a:endParaRPr lang="en-US" dirty="0" smtClean="0">
+              <a:solidFill>
+                <a:schemeClr val="tx1"/>
+              </a:solidFill>
+            </a:endParaRPr>
+          </a:p>
+          <a:p>
+            <a:pPr algn="ctr"/>
+            <a:endParaRPr lang="en-US" dirty="0">
+              <a:solidFill>
+                <a:schemeClr val="tx1"/>
+              </a:solidFill>
+            </a:endParaRPr>
+          </a:p>
+        </p:txBody>
+      </p:sp>
+      <p:cxnSp>
+        <p:nvCxnSpPr>
+          <p:cNvPr id="120" name="Straight Connector 119"/>
+          <p:cNvCxnSpPr>
+            <a:stCxn id="23" idx="3"/>
+          </p:cNvCxnSpPr>
+          <p:nvPr/>
+        </p:nvCxnSpPr>
+        <p:spPr>
+          <a:xfrm flipV="1">
+            <a:off x="5056090" y="3282437"/>
+            <a:ext cx="4159629" cy="1"/>
+          </a:xfrm>
+          <a:prstGeom prst="line">
+            <a:avLst/>
+          </a:prstGeom>
+          <a:ln w="12700">
+            <a:solidFill>
+              <a:schemeClr val="tx1"/>
+            </a:solidFill>
+          </a:ln>
+        </p:spPr>
+        <p:style>
+          <a:lnRef idx="1">
+            <a:schemeClr val="accent1"/>
+          </a:lnRef>
+          <a:fillRef idx="0">
+            <a:schemeClr val="accent1"/>
+          </a:fillRef>
+          <a:effectRef idx="0">
+            <a:schemeClr val="accent1"/>
+          </a:effectRef>
+          <a:fontRef idx="minor">
+            <a:schemeClr val="tx1"/>
+          </a:fontRef>
+        </p:style>
+      </p:cxnSp>
+      <p:cxnSp>
+        <p:nvCxnSpPr>
+          <p:cNvPr id="122" name="Straight Connector 121"/>
+          <p:cNvCxnSpPr>
+            <a:stCxn id="55" idx="3"/>
+          </p:cNvCxnSpPr>
+          <p:nvPr/>
+        </p:nvCxnSpPr>
+        <p:spPr>
+          <a:xfrm flipV="1">
+            <a:off x="5055421" y="4516857"/>
+            <a:ext cx="4160298" cy="1"/>
+          </a:xfrm>
+          <a:prstGeom prst="line">
+            <a:avLst/>
+          </a:prstGeom>
+          <a:ln w="12700">
+            <a:solidFill>
+              <a:schemeClr val="tx1"/>
+            </a:solidFill>
+          </a:ln>
+        </p:spPr>
+        <p:style>
+          <a:lnRef idx="1">
+            <a:schemeClr val="accent1"/>
+          </a:lnRef>
+          <a:fillRef idx="0">
+            <a:schemeClr val="accent1"/>
+          </a:fillRef>
+          <a:effectRef idx="0">
+            <a:schemeClr val="accent1"/>
+          </a:effectRef>
+          <a:fontRef idx="minor">
+            <a:schemeClr val="tx1"/>
+          </a:fontRef>
+        </p:style>
+      </p:cxnSp>
+      <p:cxnSp>
+        <p:nvCxnSpPr>
+          <p:cNvPr id="124" name="Straight Connector 123"/>
+          <p:cNvCxnSpPr>
+            <a:stCxn id="54" idx="3"/>
+          </p:cNvCxnSpPr>
+          <p:nvPr/>
+        </p:nvCxnSpPr>
+        <p:spPr>
+          <a:xfrm flipV="1">
+            <a:off x="5062814" y="5761179"/>
+            <a:ext cx="4152905" cy="1"/>
+          </a:xfrm>
+          <a:prstGeom prst="line">
+            <a:avLst/>
+          </a:prstGeom>
+          <a:ln w="12700">
+            <a:solidFill>
+              <a:schemeClr val="tx1"/>
+            </a:solidFill>
+          </a:ln>
+        </p:spPr>
+        <p:style>
+          <a:lnRef idx="1">
+            <a:schemeClr val="accent1"/>
+          </a:lnRef>
+          <a:fillRef idx="0">
+            <a:schemeClr val="accent1"/>
+          </a:fillRef>
+          <a:effectRef idx="0">
+            <a:schemeClr val="accent1"/>
+          </a:effectRef>
+          <a:fontRef idx="minor">
+            <a:schemeClr val="tx1"/>
+          </a:fontRef>
+        </p:style>
+      </p:cxnSp>
+      <p:cxnSp>
+        <p:nvCxnSpPr>
+          <p:cNvPr id="126" name="Straight Connector 125"/>
+          <p:cNvCxnSpPr>
+            <a:stCxn id="118" idx="3"/>
+          </p:cNvCxnSpPr>
+          <p:nvPr/>
+        </p:nvCxnSpPr>
+        <p:spPr>
+          <a:xfrm flipV="1">
+            <a:off x="9785874" y="4516857"/>
+            <a:ext cx="826545" cy="28479"/>
+          </a:xfrm>
+          <a:prstGeom prst="line">
+            <a:avLst/>
+          </a:prstGeom>
+          <a:ln w="12700">
+            <a:solidFill>
+              <a:schemeClr val="tx1"/>
+            </a:solidFill>
+          </a:ln>
+        </p:spPr>
+        <p:style>
+          <a:lnRef idx="1">
+            <a:schemeClr val="accent1"/>
+          </a:lnRef>
+          <a:fillRef idx="0">
+            <a:schemeClr val="accent1"/>
+          </a:fillRef>
+          <a:effectRef idx="0">
+            <a:schemeClr val="accent1"/>
+          </a:effectRef>
+          <a:fontRef idx="minor">
+            <a:schemeClr val="tx1"/>
+          </a:fontRef>
+        </p:style>
+      </p:cxnSp>
+      <p:cxnSp>
+        <p:nvCxnSpPr>
+          <p:cNvPr id="128" name="Straight Connector 127"/>
+          <p:cNvCxnSpPr/>
+          <p:nvPr/>
+        </p:nvCxnSpPr>
+        <p:spPr>
+          <a:xfrm flipH="1">
+            <a:off x="1591234" y="855233"/>
+            <a:ext cx="775448" cy="0"/>
+          </a:xfrm>
+          <a:prstGeom prst="line">
+            <a:avLst/>
+          </a:prstGeom>
+          <a:ln w="12700">
+            <a:solidFill>
+              <a:schemeClr val="tx1"/>
+            </a:solidFill>
+          </a:ln>
+        </p:spPr>
+        <p:style>
+          <a:lnRef idx="1">
+            <a:schemeClr val="accent1"/>
+          </a:lnRef>
+          <a:fillRef idx="0">
+            <a:schemeClr val="accent1"/>
+          </a:fillRef>
+          <a:effectRef idx="0">
+            <a:schemeClr val="accent1"/>
+          </a:effectRef>
+          <a:fontRef idx="minor">
+            <a:schemeClr val="tx1"/>
+          </a:fontRef>
+        </p:style>
+      </p:cxnSp>
     </p:spTree>
     <p:extLst>
       <p:ext uri="{BB962C8B-B14F-4D97-AF65-F5344CB8AC3E}">

</xml_diff>

<commit_message>
Some updates to diagrams
</commit_message>
<xml_diff>
--- a/Kristina/diagrams.pptx
+++ b/Kristina/diagrams.pptx
@@ -5,8 +5,7 @@
     <p:sldMasterId id="2147483648" r:id="rId1"/>
   </p:sldMasterIdLst>
   <p:sldIdLst>
-    <p:sldId id="256" r:id="rId2"/>
-    <p:sldId id="257" r:id="rId3"/>
+    <p:sldId id="257" r:id="rId2"/>
   </p:sldIdLst>
   <p:sldSz cx="12192000" cy="6858000"/>
   <p:notesSz cx="6858000" cy="9144000"/>
@@ -244,7 +243,7 @@
           <a:p>
             <a:fld id="{CA8AF1EC-5B5A-4907-A408-775BA283839D}" type="datetimeFigureOut">
               <a:rPr lang="en-US" smtClean="0"/>
-              <a:t>12/7/2014</a:t>
+              <a:t>12/8/2014</a:t>
             </a:fld>
             <a:endParaRPr lang="en-US"/>
           </a:p>
@@ -414,7 +413,7 @@
           <a:p>
             <a:fld id="{CA8AF1EC-5B5A-4907-A408-775BA283839D}" type="datetimeFigureOut">
               <a:rPr lang="en-US" smtClean="0"/>
-              <a:t>12/7/2014</a:t>
+              <a:t>12/8/2014</a:t>
             </a:fld>
             <a:endParaRPr lang="en-US"/>
           </a:p>
@@ -594,7 +593,7 @@
           <a:p>
             <a:fld id="{CA8AF1EC-5B5A-4907-A408-775BA283839D}" type="datetimeFigureOut">
               <a:rPr lang="en-US" smtClean="0"/>
-              <a:t>12/7/2014</a:t>
+              <a:t>12/8/2014</a:t>
             </a:fld>
             <a:endParaRPr lang="en-US"/>
           </a:p>
@@ -764,7 +763,7 @@
           <a:p>
             <a:fld id="{CA8AF1EC-5B5A-4907-A408-775BA283839D}" type="datetimeFigureOut">
               <a:rPr lang="en-US" smtClean="0"/>
-              <a:t>12/7/2014</a:t>
+              <a:t>12/8/2014</a:t>
             </a:fld>
             <a:endParaRPr lang="en-US"/>
           </a:p>
@@ -1010,7 +1009,7 @@
           <a:p>
             <a:fld id="{CA8AF1EC-5B5A-4907-A408-775BA283839D}" type="datetimeFigureOut">
               <a:rPr lang="en-US" smtClean="0"/>
-              <a:t>12/7/2014</a:t>
+              <a:t>12/8/2014</a:t>
             </a:fld>
             <a:endParaRPr lang="en-US"/>
           </a:p>
@@ -1242,7 +1241,7 @@
           <a:p>
             <a:fld id="{CA8AF1EC-5B5A-4907-A408-775BA283839D}" type="datetimeFigureOut">
               <a:rPr lang="en-US" smtClean="0"/>
-              <a:t>12/7/2014</a:t>
+              <a:t>12/8/2014</a:t>
             </a:fld>
             <a:endParaRPr lang="en-US"/>
           </a:p>
@@ -1609,7 +1608,7 @@
           <a:p>
             <a:fld id="{CA8AF1EC-5B5A-4907-A408-775BA283839D}" type="datetimeFigureOut">
               <a:rPr lang="en-US" smtClean="0"/>
-              <a:t>12/7/2014</a:t>
+              <a:t>12/8/2014</a:t>
             </a:fld>
             <a:endParaRPr lang="en-US"/>
           </a:p>
@@ -1727,7 +1726,7 @@
           <a:p>
             <a:fld id="{CA8AF1EC-5B5A-4907-A408-775BA283839D}" type="datetimeFigureOut">
               <a:rPr lang="en-US" smtClean="0"/>
-              <a:t>12/7/2014</a:t>
+              <a:t>12/8/2014</a:t>
             </a:fld>
             <a:endParaRPr lang="en-US"/>
           </a:p>
@@ -1822,7 +1821,7 @@
           <a:p>
             <a:fld id="{CA8AF1EC-5B5A-4907-A408-775BA283839D}" type="datetimeFigureOut">
               <a:rPr lang="en-US" smtClean="0"/>
-              <a:t>12/7/2014</a:t>
+              <a:t>12/8/2014</a:t>
             </a:fld>
             <a:endParaRPr lang="en-US"/>
           </a:p>
@@ -2099,7 +2098,7 @@
           <a:p>
             <a:fld id="{CA8AF1EC-5B5A-4907-A408-775BA283839D}" type="datetimeFigureOut">
               <a:rPr lang="en-US" smtClean="0"/>
-              <a:t>12/7/2014</a:t>
+              <a:t>12/8/2014</a:t>
             </a:fld>
             <a:endParaRPr lang="en-US"/>
           </a:p>
@@ -2352,7 +2351,7 @@
           <a:p>
             <a:fld id="{CA8AF1EC-5B5A-4907-A408-775BA283839D}" type="datetimeFigureOut">
               <a:rPr lang="en-US" smtClean="0"/>
-              <a:t>12/7/2014</a:t>
+              <a:t>12/8/2014</a:t>
             </a:fld>
             <a:endParaRPr lang="en-US"/>
           </a:p>
@@ -2565,7 +2564,7 @@
           <a:p>
             <a:fld id="{CA8AF1EC-5B5A-4907-A408-775BA283839D}" type="datetimeFigureOut">
               <a:rPr lang="en-US" smtClean="0"/>
-              <a:t>12/7/2014</a:t>
+              <a:t>12/8/2014</a:t>
             </a:fld>
             <a:endParaRPr lang="en-US"/>
           </a:p>
@@ -2970,81 +2969,6 @@
           <a:chExt cx="0" cy="0"/>
         </a:xfrm>
       </p:grpSpPr>
-      <p:sp>
-        <p:nvSpPr>
-          <p:cNvPr id="2" name="Title 1"/>
-          <p:cNvSpPr>
-            <a:spLocks noGrp="1"/>
-          </p:cNvSpPr>
-          <p:nvPr>
-            <p:ph type="ctrTitle"/>
-          </p:nvPr>
-        </p:nvSpPr>
-        <p:spPr/>
-        <p:txBody>
-          <a:bodyPr/>
-          <a:lstStyle/>
-          <a:p>
-            <a:endParaRPr lang="en-US"/>
-          </a:p>
-        </p:txBody>
-      </p:sp>
-      <p:sp>
-        <p:nvSpPr>
-          <p:cNvPr id="3" name="Subtitle 2"/>
-          <p:cNvSpPr>
-            <a:spLocks noGrp="1"/>
-          </p:cNvSpPr>
-          <p:nvPr>
-            <p:ph type="subTitle" idx="1"/>
-          </p:nvPr>
-        </p:nvSpPr>
-        <p:spPr/>
-        <p:txBody>
-          <a:bodyPr/>
-          <a:lstStyle/>
-          <a:p>
-            <a:endParaRPr lang="en-US"/>
-          </a:p>
-        </p:txBody>
-      </p:sp>
-    </p:spTree>
-    <p:extLst>
-      <p:ext uri="{BB962C8B-B14F-4D97-AF65-F5344CB8AC3E}">
-        <p14:creationId xmlns:p14="http://schemas.microsoft.com/office/powerpoint/2010/main" val="4105265760"/>
-      </p:ext>
-    </p:extLst>
-  </p:cSld>
-  <p:clrMapOvr>
-    <a:masterClrMapping/>
-  </p:clrMapOvr>
-  <p:timing>
-    <p:tnLst>
-      <p:par>
-        <p:cTn id="1" dur="indefinite" restart="never" nodeType="tmRoot"/>
-      </p:par>
-    </p:tnLst>
-  </p:timing>
-</p:sld>
-</file>
-
-<file path=ppt/slides/slide2.xml><?xml version="1.0" encoding="utf-8"?>
-<p:sld xmlns:a="http://schemas.openxmlformats.org/drawingml/2006/main" xmlns:r="http://schemas.openxmlformats.org/officeDocument/2006/relationships" xmlns:p="http://schemas.openxmlformats.org/presentationml/2006/main">
-  <p:cSld>
-    <p:spTree>
-      <p:nvGrpSpPr>
-        <p:cNvPr id="1" name=""/>
-        <p:cNvGrpSpPr/>
-        <p:nvPr/>
-      </p:nvGrpSpPr>
-      <p:grpSpPr>
-        <a:xfrm>
-          <a:off x="0" y="0"/>
-          <a:ext cx="0" cy="0"/>
-          <a:chOff x="0" y="0"/>
-          <a:chExt cx="0" cy="0"/>
-        </a:xfrm>
-      </p:grpSpPr>
       <p:grpSp>
         <p:nvGrpSpPr>
           <p:cNvPr id="4" name="Group 3"/>
@@ -5134,8 +5058,8 @@
           </a:fontRef>
         </p:style>
       </p:cxnSp>
-      <mc:AlternateContent xmlns:mc="http://schemas.openxmlformats.org/markup-compatibility/2006">
-        <mc:Choice xmlns:a14="http://schemas.microsoft.com/office/drawing/2010/main" Requires="a14">
+      <mc:AlternateContent xmlns:mc="http://schemas.openxmlformats.org/markup-compatibility/2006" xmlns:a14="http://schemas.microsoft.com/office/drawing/2010/main">
+        <mc:Choice Requires="a14">
           <p:sp>
             <p:nvSpPr>
               <p:cNvPr id="115" name="TextBox 114"/>
@@ -5158,6 +5082,7 @@
               </a:bodyPr>
               <a:lstStyle/>
               <a:p>
+                <a:pPr/>
                 <a14:m>
                   <m:oMathPara xmlns:m="http://schemas.openxmlformats.org/officeDocument/2006/math">
                     <m:oMathParaPr>
@@ -5197,7 +5122,7 @@
             </p:txBody>
           </p:sp>
         </mc:Choice>
-        <mc:Fallback>
+        <mc:Fallback xmlns="">
           <p:sp>
             <p:nvSpPr>
               <p:cNvPr id="115" name="TextBox 114"/>
@@ -5236,8 +5161,8 @@
           </p:sp>
         </mc:Fallback>
       </mc:AlternateContent>
-      <mc:AlternateContent xmlns:mc="http://schemas.openxmlformats.org/markup-compatibility/2006">
-        <mc:Choice xmlns:a14="http://schemas.microsoft.com/office/drawing/2010/main" Requires="a14">
+      <mc:AlternateContent xmlns:mc="http://schemas.openxmlformats.org/markup-compatibility/2006" xmlns:a14="http://schemas.microsoft.com/office/drawing/2010/main">
+        <mc:Choice Requires="a14">
           <p:sp>
             <p:nvSpPr>
               <p:cNvPr id="116" name="TextBox 115"/>
@@ -5260,6 +5185,7 @@
               </a:bodyPr>
               <a:lstStyle/>
               <a:p>
+                <a:pPr/>
                 <a14:m>
                   <m:oMathPara xmlns:m="http://schemas.openxmlformats.org/officeDocument/2006/math">
                     <m:oMathParaPr>
@@ -5299,7 +5225,7 @@
             </p:txBody>
           </p:sp>
         </mc:Choice>
-        <mc:Fallback>
+        <mc:Fallback xmlns="">
           <p:sp>
             <p:nvSpPr>
               <p:cNvPr id="116" name="TextBox 115"/>
@@ -5338,8 +5264,8 @@
           </p:sp>
         </mc:Fallback>
       </mc:AlternateContent>
-      <mc:AlternateContent xmlns:mc="http://schemas.openxmlformats.org/markup-compatibility/2006">
-        <mc:Choice xmlns:a14="http://schemas.microsoft.com/office/drawing/2010/main" Requires="a14">
+      <mc:AlternateContent xmlns:mc="http://schemas.openxmlformats.org/markup-compatibility/2006" xmlns:a14="http://schemas.microsoft.com/office/drawing/2010/main">
+        <mc:Choice Requires="a14">
           <p:sp>
             <p:nvSpPr>
               <p:cNvPr id="117" name="TextBox 116"/>
@@ -5362,6 +5288,7 @@
               </a:bodyPr>
               <a:lstStyle/>
               <a:p>
+                <a:pPr/>
                 <a14:m>
                   <m:oMathPara xmlns:m="http://schemas.openxmlformats.org/officeDocument/2006/math">
                     <m:oMathParaPr>
@@ -5401,7 +5328,7 @@
             </p:txBody>
           </p:sp>
         </mc:Choice>
-        <mc:Fallback>
+        <mc:Fallback xmlns="">
           <p:sp>
             <p:nvSpPr>
               <p:cNvPr id="117" name="TextBox 116"/>

</xml_diff>

<commit_message>
Added labeled diagram of final system
</commit_message>
<xml_diff>
--- a/Kristina/diagrams.pptx
+++ b/Kristina/diagrams.pptx
@@ -4,8 +4,12 @@
   <p:sldMasterIdLst>
     <p:sldMasterId id="2147483648" r:id="rId1"/>
   </p:sldMasterIdLst>
+  <p:notesMasterIdLst>
+    <p:notesMasterId r:id="rId4"/>
+  </p:notesMasterIdLst>
   <p:sldIdLst>
     <p:sldId id="257" r:id="rId2"/>
+    <p:sldId id="258" r:id="rId3"/>
   </p:sldIdLst>
   <p:sldSz cx="12192000" cy="6858000"/>
   <p:notesSz cx="6858000" cy="9144000"/>
@@ -112,6 +116,440 @@
 </p:presentation>
 </file>
 
+<file path=ppt/notesMasters/notesMaster1.xml><?xml version="1.0" encoding="utf-8"?>
+<p:notesMaster xmlns:a="http://schemas.openxmlformats.org/drawingml/2006/main" xmlns:r="http://schemas.openxmlformats.org/officeDocument/2006/relationships" xmlns:p="http://schemas.openxmlformats.org/presentationml/2006/main">
+  <p:cSld>
+    <p:bg>
+      <p:bgRef idx="1001">
+        <a:schemeClr val="bg1"/>
+      </p:bgRef>
+    </p:bg>
+    <p:spTree>
+      <p:nvGrpSpPr>
+        <p:cNvPr id="1" name=""/>
+        <p:cNvGrpSpPr/>
+        <p:nvPr/>
+      </p:nvGrpSpPr>
+      <p:grpSpPr>
+        <a:xfrm>
+          <a:off x="0" y="0"/>
+          <a:ext cx="0" cy="0"/>
+          <a:chOff x="0" y="0"/>
+          <a:chExt cx="0" cy="0"/>
+        </a:xfrm>
+      </p:grpSpPr>
+      <p:sp>
+        <p:nvSpPr>
+          <p:cNvPr id="2" name="Header Placeholder 1"/>
+          <p:cNvSpPr>
+            <a:spLocks noGrp="1"/>
+          </p:cNvSpPr>
+          <p:nvPr>
+            <p:ph type="hdr" sz="quarter"/>
+          </p:nvPr>
+        </p:nvSpPr>
+        <p:spPr>
+          <a:xfrm>
+            <a:off x="0" y="0"/>
+            <a:ext cx="2971800" cy="458788"/>
+          </a:xfrm>
+          <a:prstGeom prst="rect">
+            <a:avLst/>
+          </a:prstGeom>
+        </p:spPr>
+        <p:txBody>
+          <a:bodyPr vert="horz" lIns="91440" tIns="45720" rIns="91440" bIns="45720" rtlCol="0"/>
+          <a:lstStyle>
+            <a:lvl1pPr algn="l">
+              <a:defRPr sz="1200"/>
+            </a:lvl1pPr>
+          </a:lstStyle>
+          <a:p>
+            <a:endParaRPr lang="en-US"/>
+          </a:p>
+        </p:txBody>
+      </p:sp>
+      <p:sp>
+        <p:nvSpPr>
+          <p:cNvPr id="3" name="Date Placeholder 2"/>
+          <p:cNvSpPr>
+            <a:spLocks noGrp="1"/>
+          </p:cNvSpPr>
+          <p:nvPr>
+            <p:ph type="dt" idx="1"/>
+          </p:nvPr>
+        </p:nvSpPr>
+        <p:spPr>
+          <a:xfrm>
+            <a:off x="3884613" y="0"/>
+            <a:ext cx="2971800" cy="458788"/>
+          </a:xfrm>
+          <a:prstGeom prst="rect">
+            <a:avLst/>
+          </a:prstGeom>
+        </p:spPr>
+        <p:txBody>
+          <a:bodyPr vert="horz" lIns="91440" tIns="45720" rIns="91440" bIns="45720" rtlCol="0"/>
+          <a:lstStyle>
+            <a:lvl1pPr algn="r">
+              <a:defRPr sz="1200"/>
+            </a:lvl1pPr>
+          </a:lstStyle>
+          <a:p>
+            <a:fld id="{C0448895-0728-4E2D-852C-4DAC0850159F}" type="datetimeFigureOut">
+              <a:rPr lang="en-US" smtClean="0"/>
+              <a:t>12/9/2014</a:t>
+            </a:fld>
+            <a:endParaRPr lang="en-US"/>
+          </a:p>
+        </p:txBody>
+      </p:sp>
+      <p:sp>
+        <p:nvSpPr>
+          <p:cNvPr id="4" name="Slide Image Placeholder 3"/>
+          <p:cNvSpPr>
+            <a:spLocks noGrp="1" noRot="1" noChangeAspect="1"/>
+          </p:cNvSpPr>
+          <p:nvPr>
+            <p:ph type="sldImg" idx="2"/>
+          </p:nvPr>
+        </p:nvSpPr>
+        <p:spPr>
+          <a:xfrm>
+            <a:off x="685800" y="1143000"/>
+            <a:ext cx="5486400" cy="3086100"/>
+          </a:xfrm>
+          <a:prstGeom prst="rect">
+            <a:avLst/>
+          </a:prstGeom>
+          <a:noFill/>
+          <a:ln w="12700">
+            <a:solidFill>
+              <a:prstClr val="black"/>
+            </a:solidFill>
+          </a:ln>
+        </p:spPr>
+        <p:txBody>
+          <a:bodyPr vert="horz" lIns="91440" tIns="45720" rIns="91440" bIns="45720" rtlCol="0" anchor="ctr"/>
+          <a:lstStyle/>
+          <a:p>
+            <a:endParaRPr lang="en-US"/>
+          </a:p>
+        </p:txBody>
+      </p:sp>
+      <p:sp>
+        <p:nvSpPr>
+          <p:cNvPr id="5" name="Notes Placeholder 4"/>
+          <p:cNvSpPr>
+            <a:spLocks noGrp="1"/>
+          </p:cNvSpPr>
+          <p:nvPr>
+            <p:ph type="body" sz="quarter" idx="3"/>
+          </p:nvPr>
+        </p:nvSpPr>
+        <p:spPr>
+          <a:xfrm>
+            <a:off x="685800" y="4400550"/>
+            <a:ext cx="5486400" cy="3600450"/>
+          </a:xfrm>
+          <a:prstGeom prst="rect">
+            <a:avLst/>
+          </a:prstGeom>
+        </p:spPr>
+        <p:txBody>
+          <a:bodyPr vert="horz" lIns="91440" tIns="45720" rIns="91440" bIns="45720" rtlCol="0"/>
+          <a:lstStyle/>
+          <a:p>
+            <a:pPr lvl="0"/>
+            <a:r>
+              <a:rPr lang="en-US" smtClean="0"/>
+              <a:t>Click to edit Master text styles</a:t>
+            </a:r>
+          </a:p>
+          <a:p>
+            <a:pPr lvl="1"/>
+            <a:r>
+              <a:rPr lang="en-US" smtClean="0"/>
+              <a:t>Second level</a:t>
+            </a:r>
+          </a:p>
+          <a:p>
+            <a:pPr lvl="2"/>
+            <a:r>
+              <a:rPr lang="en-US" smtClean="0"/>
+              <a:t>Third level</a:t>
+            </a:r>
+          </a:p>
+          <a:p>
+            <a:pPr lvl="3"/>
+            <a:r>
+              <a:rPr lang="en-US" smtClean="0"/>
+              <a:t>Fourth level</a:t>
+            </a:r>
+          </a:p>
+          <a:p>
+            <a:pPr lvl="4"/>
+            <a:r>
+              <a:rPr lang="en-US" smtClean="0"/>
+              <a:t>Fifth level</a:t>
+            </a:r>
+            <a:endParaRPr lang="en-US"/>
+          </a:p>
+        </p:txBody>
+      </p:sp>
+      <p:sp>
+        <p:nvSpPr>
+          <p:cNvPr id="6" name="Footer Placeholder 5"/>
+          <p:cNvSpPr>
+            <a:spLocks noGrp="1"/>
+          </p:cNvSpPr>
+          <p:nvPr>
+            <p:ph type="ftr" sz="quarter" idx="4"/>
+          </p:nvPr>
+        </p:nvSpPr>
+        <p:spPr>
+          <a:xfrm>
+            <a:off x="0" y="8685213"/>
+            <a:ext cx="2971800" cy="458787"/>
+          </a:xfrm>
+          <a:prstGeom prst="rect">
+            <a:avLst/>
+          </a:prstGeom>
+        </p:spPr>
+        <p:txBody>
+          <a:bodyPr vert="horz" lIns="91440" tIns="45720" rIns="91440" bIns="45720" rtlCol="0" anchor="b"/>
+          <a:lstStyle>
+            <a:lvl1pPr algn="l">
+              <a:defRPr sz="1200"/>
+            </a:lvl1pPr>
+          </a:lstStyle>
+          <a:p>
+            <a:endParaRPr lang="en-US"/>
+          </a:p>
+        </p:txBody>
+      </p:sp>
+      <p:sp>
+        <p:nvSpPr>
+          <p:cNvPr id="7" name="Slide Number Placeholder 6"/>
+          <p:cNvSpPr>
+            <a:spLocks noGrp="1"/>
+          </p:cNvSpPr>
+          <p:nvPr>
+            <p:ph type="sldNum" sz="quarter" idx="5"/>
+          </p:nvPr>
+        </p:nvSpPr>
+        <p:spPr>
+          <a:xfrm>
+            <a:off x="3884613" y="8685213"/>
+            <a:ext cx="2971800" cy="458787"/>
+          </a:xfrm>
+          <a:prstGeom prst="rect">
+            <a:avLst/>
+          </a:prstGeom>
+        </p:spPr>
+        <p:txBody>
+          <a:bodyPr vert="horz" lIns="91440" tIns="45720" rIns="91440" bIns="45720" rtlCol="0" anchor="b"/>
+          <a:lstStyle>
+            <a:lvl1pPr algn="r">
+              <a:defRPr sz="1200"/>
+            </a:lvl1pPr>
+          </a:lstStyle>
+          <a:p>
+            <a:fld id="{D48327C9-E460-4B62-A959-26906B70C811}" type="slidenum">
+              <a:rPr lang="en-US" smtClean="0"/>
+              <a:t>‹#›</a:t>
+            </a:fld>
+            <a:endParaRPr lang="en-US"/>
+          </a:p>
+        </p:txBody>
+      </p:sp>
+    </p:spTree>
+    <p:extLst>
+      <p:ext uri="{BB962C8B-B14F-4D97-AF65-F5344CB8AC3E}">
+        <p14:creationId xmlns:p14="http://schemas.microsoft.com/office/powerpoint/2010/main" val="2450917625"/>
+      </p:ext>
+    </p:extLst>
+  </p:cSld>
+  <p:clrMap bg1="lt1" tx1="dk1" bg2="lt2" tx2="dk2" accent1="accent1" accent2="accent2" accent3="accent3" accent4="accent4" accent5="accent5" accent6="accent6" hlink="hlink" folHlink="folHlink"/>
+  <p:notesStyle>
+    <a:lvl1pPr marL="0" algn="l" defTabSz="914400" rtl="0" eaLnBrk="1" latinLnBrk="0" hangingPunct="1">
+      <a:defRPr sz="1200" kern="1200">
+        <a:solidFill>
+          <a:schemeClr val="tx1"/>
+        </a:solidFill>
+        <a:latin typeface="+mn-lt"/>
+        <a:ea typeface="+mn-ea"/>
+        <a:cs typeface="+mn-cs"/>
+      </a:defRPr>
+    </a:lvl1pPr>
+    <a:lvl2pPr marL="457200" algn="l" defTabSz="914400" rtl="0" eaLnBrk="1" latinLnBrk="0" hangingPunct="1">
+      <a:defRPr sz="1200" kern="1200">
+        <a:solidFill>
+          <a:schemeClr val="tx1"/>
+        </a:solidFill>
+        <a:latin typeface="+mn-lt"/>
+        <a:ea typeface="+mn-ea"/>
+        <a:cs typeface="+mn-cs"/>
+      </a:defRPr>
+    </a:lvl2pPr>
+    <a:lvl3pPr marL="914400" algn="l" defTabSz="914400" rtl="0" eaLnBrk="1" latinLnBrk="0" hangingPunct="1">
+      <a:defRPr sz="1200" kern="1200">
+        <a:solidFill>
+          <a:schemeClr val="tx1"/>
+        </a:solidFill>
+        <a:latin typeface="+mn-lt"/>
+        <a:ea typeface="+mn-ea"/>
+        <a:cs typeface="+mn-cs"/>
+      </a:defRPr>
+    </a:lvl3pPr>
+    <a:lvl4pPr marL="1371600" algn="l" defTabSz="914400" rtl="0" eaLnBrk="1" latinLnBrk="0" hangingPunct="1">
+      <a:defRPr sz="1200" kern="1200">
+        <a:solidFill>
+          <a:schemeClr val="tx1"/>
+        </a:solidFill>
+        <a:latin typeface="+mn-lt"/>
+        <a:ea typeface="+mn-ea"/>
+        <a:cs typeface="+mn-cs"/>
+      </a:defRPr>
+    </a:lvl4pPr>
+    <a:lvl5pPr marL="1828800" algn="l" defTabSz="914400" rtl="0" eaLnBrk="1" latinLnBrk="0" hangingPunct="1">
+      <a:defRPr sz="1200" kern="1200">
+        <a:solidFill>
+          <a:schemeClr val="tx1"/>
+        </a:solidFill>
+        <a:latin typeface="+mn-lt"/>
+        <a:ea typeface="+mn-ea"/>
+        <a:cs typeface="+mn-cs"/>
+      </a:defRPr>
+    </a:lvl5pPr>
+    <a:lvl6pPr marL="2286000" algn="l" defTabSz="914400" rtl="0" eaLnBrk="1" latinLnBrk="0" hangingPunct="1">
+      <a:defRPr sz="1200" kern="1200">
+        <a:solidFill>
+          <a:schemeClr val="tx1"/>
+        </a:solidFill>
+        <a:latin typeface="+mn-lt"/>
+        <a:ea typeface="+mn-ea"/>
+        <a:cs typeface="+mn-cs"/>
+      </a:defRPr>
+    </a:lvl6pPr>
+    <a:lvl7pPr marL="2743200" algn="l" defTabSz="914400" rtl="0" eaLnBrk="1" latinLnBrk="0" hangingPunct="1">
+      <a:defRPr sz="1200" kern="1200">
+        <a:solidFill>
+          <a:schemeClr val="tx1"/>
+        </a:solidFill>
+        <a:latin typeface="+mn-lt"/>
+        <a:ea typeface="+mn-ea"/>
+        <a:cs typeface="+mn-cs"/>
+      </a:defRPr>
+    </a:lvl7pPr>
+    <a:lvl8pPr marL="3200400" algn="l" defTabSz="914400" rtl="0" eaLnBrk="1" latinLnBrk="0" hangingPunct="1">
+      <a:defRPr sz="1200" kern="1200">
+        <a:solidFill>
+          <a:schemeClr val="tx1"/>
+        </a:solidFill>
+        <a:latin typeface="+mn-lt"/>
+        <a:ea typeface="+mn-ea"/>
+        <a:cs typeface="+mn-cs"/>
+      </a:defRPr>
+    </a:lvl8pPr>
+    <a:lvl9pPr marL="3657600" algn="l" defTabSz="914400" rtl="0" eaLnBrk="1" latinLnBrk="0" hangingPunct="1">
+      <a:defRPr sz="1200" kern="1200">
+        <a:solidFill>
+          <a:schemeClr val="tx1"/>
+        </a:solidFill>
+        <a:latin typeface="+mn-lt"/>
+        <a:ea typeface="+mn-ea"/>
+        <a:cs typeface="+mn-cs"/>
+      </a:defRPr>
+    </a:lvl9pPr>
+  </p:notesStyle>
+</p:notesMaster>
+</file>
+
+<file path=ppt/notesSlides/notesSlide1.xml><?xml version="1.0" encoding="utf-8"?>
+<p:notes xmlns:a="http://schemas.openxmlformats.org/drawingml/2006/main" xmlns:r="http://schemas.openxmlformats.org/officeDocument/2006/relationships" xmlns:p="http://schemas.openxmlformats.org/presentationml/2006/main">
+  <p:cSld>
+    <p:spTree>
+      <p:nvGrpSpPr>
+        <p:cNvPr id="1" name=""/>
+        <p:cNvGrpSpPr/>
+        <p:nvPr/>
+      </p:nvGrpSpPr>
+      <p:grpSpPr>
+        <a:xfrm>
+          <a:off x="0" y="0"/>
+          <a:ext cx="0" cy="0"/>
+          <a:chOff x="0" y="0"/>
+          <a:chExt cx="0" cy="0"/>
+        </a:xfrm>
+      </p:grpSpPr>
+      <p:sp>
+        <p:nvSpPr>
+          <p:cNvPr id="2" name="Slide Image Placeholder 1"/>
+          <p:cNvSpPr>
+            <a:spLocks noGrp="1" noRot="1" noChangeAspect="1"/>
+          </p:cNvSpPr>
+          <p:nvPr>
+            <p:ph type="sldImg"/>
+          </p:nvPr>
+        </p:nvSpPr>
+        <p:spPr/>
+      </p:sp>
+      <p:sp>
+        <p:nvSpPr>
+          <p:cNvPr id="3" name="Notes Placeholder 2"/>
+          <p:cNvSpPr>
+            <a:spLocks noGrp="1"/>
+          </p:cNvSpPr>
+          <p:nvPr>
+            <p:ph type="body" idx="1"/>
+          </p:nvPr>
+        </p:nvSpPr>
+        <p:spPr/>
+        <p:txBody>
+          <a:bodyPr/>
+          <a:lstStyle/>
+          <a:p>
+            <a:endParaRPr lang="en-US"/>
+          </a:p>
+        </p:txBody>
+      </p:sp>
+      <p:sp>
+        <p:nvSpPr>
+          <p:cNvPr id="4" name="Slide Number Placeholder 3"/>
+          <p:cNvSpPr>
+            <a:spLocks noGrp="1"/>
+          </p:cNvSpPr>
+          <p:nvPr>
+            <p:ph type="sldNum" sz="quarter" idx="10"/>
+          </p:nvPr>
+        </p:nvSpPr>
+        <p:spPr/>
+        <p:txBody>
+          <a:bodyPr/>
+          <a:lstStyle/>
+          <a:p>
+            <a:fld id="{D48327C9-E460-4B62-A959-26906B70C811}" type="slidenum">
+              <a:rPr lang="en-US" smtClean="0"/>
+              <a:t>2</a:t>
+            </a:fld>
+            <a:endParaRPr lang="en-US"/>
+          </a:p>
+        </p:txBody>
+      </p:sp>
+    </p:spTree>
+    <p:extLst>
+      <p:ext uri="{BB962C8B-B14F-4D97-AF65-F5344CB8AC3E}">
+        <p14:creationId xmlns:p14="http://schemas.microsoft.com/office/powerpoint/2010/main" val="3080992033"/>
+      </p:ext>
+    </p:extLst>
+  </p:cSld>
+  <p:clrMapOvr>
+    <a:masterClrMapping/>
+  </p:clrMapOvr>
+</p:notes>
+</file>
+
 <file path=ppt/slideLayouts/slideLayout1.xml><?xml version="1.0" encoding="utf-8"?>
 <p:sldLayout xmlns:a="http://schemas.openxmlformats.org/drawingml/2006/main" xmlns:r="http://schemas.openxmlformats.org/officeDocument/2006/relationships" xmlns:p="http://schemas.openxmlformats.org/presentationml/2006/main" type="title" preserve="1">
   <p:cSld name="Title Slide">
@@ -243,7 +681,7 @@
           <a:p>
             <a:fld id="{CA8AF1EC-5B5A-4907-A408-775BA283839D}" type="datetimeFigureOut">
               <a:rPr lang="en-US" smtClean="0"/>
-              <a:t>12/8/2014</a:t>
+              <a:t>12/9/2014</a:t>
             </a:fld>
             <a:endParaRPr lang="en-US"/>
           </a:p>
@@ -413,7 +851,7 @@
           <a:p>
             <a:fld id="{CA8AF1EC-5B5A-4907-A408-775BA283839D}" type="datetimeFigureOut">
               <a:rPr lang="en-US" smtClean="0"/>
-              <a:t>12/8/2014</a:t>
+              <a:t>12/9/2014</a:t>
             </a:fld>
             <a:endParaRPr lang="en-US"/>
           </a:p>
@@ -593,7 +1031,7 @@
           <a:p>
             <a:fld id="{CA8AF1EC-5B5A-4907-A408-775BA283839D}" type="datetimeFigureOut">
               <a:rPr lang="en-US" smtClean="0"/>
-              <a:t>12/8/2014</a:t>
+              <a:t>12/9/2014</a:t>
             </a:fld>
             <a:endParaRPr lang="en-US"/>
           </a:p>
@@ -763,7 +1201,7 @@
           <a:p>
             <a:fld id="{CA8AF1EC-5B5A-4907-A408-775BA283839D}" type="datetimeFigureOut">
               <a:rPr lang="en-US" smtClean="0"/>
-              <a:t>12/8/2014</a:t>
+              <a:t>12/9/2014</a:t>
             </a:fld>
             <a:endParaRPr lang="en-US"/>
           </a:p>
@@ -1009,7 +1447,7 @@
           <a:p>
             <a:fld id="{CA8AF1EC-5B5A-4907-A408-775BA283839D}" type="datetimeFigureOut">
               <a:rPr lang="en-US" smtClean="0"/>
-              <a:t>12/8/2014</a:t>
+              <a:t>12/9/2014</a:t>
             </a:fld>
             <a:endParaRPr lang="en-US"/>
           </a:p>
@@ -1241,7 +1679,7 @@
           <a:p>
             <a:fld id="{CA8AF1EC-5B5A-4907-A408-775BA283839D}" type="datetimeFigureOut">
               <a:rPr lang="en-US" smtClean="0"/>
-              <a:t>12/8/2014</a:t>
+              <a:t>12/9/2014</a:t>
             </a:fld>
             <a:endParaRPr lang="en-US"/>
           </a:p>
@@ -1608,7 +2046,7 @@
           <a:p>
             <a:fld id="{CA8AF1EC-5B5A-4907-A408-775BA283839D}" type="datetimeFigureOut">
               <a:rPr lang="en-US" smtClean="0"/>
-              <a:t>12/8/2014</a:t>
+              <a:t>12/9/2014</a:t>
             </a:fld>
             <a:endParaRPr lang="en-US"/>
           </a:p>
@@ -1726,7 +2164,7 @@
           <a:p>
             <a:fld id="{CA8AF1EC-5B5A-4907-A408-775BA283839D}" type="datetimeFigureOut">
               <a:rPr lang="en-US" smtClean="0"/>
-              <a:t>12/8/2014</a:t>
+              <a:t>12/9/2014</a:t>
             </a:fld>
             <a:endParaRPr lang="en-US"/>
           </a:p>
@@ -1821,7 +2259,7 @@
           <a:p>
             <a:fld id="{CA8AF1EC-5B5A-4907-A408-775BA283839D}" type="datetimeFigureOut">
               <a:rPr lang="en-US" smtClean="0"/>
-              <a:t>12/8/2014</a:t>
+              <a:t>12/9/2014</a:t>
             </a:fld>
             <a:endParaRPr lang="en-US"/>
           </a:p>
@@ -2098,7 +2536,7 @@
           <a:p>
             <a:fld id="{CA8AF1EC-5B5A-4907-A408-775BA283839D}" type="datetimeFigureOut">
               <a:rPr lang="en-US" smtClean="0"/>
-              <a:t>12/8/2014</a:t>
+              <a:t>12/9/2014</a:t>
             </a:fld>
             <a:endParaRPr lang="en-US"/>
           </a:p>
@@ -2351,7 +2789,7 @@
           <a:p>
             <a:fld id="{CA8AF1EC-5B5A-4907-A408-775BA283839D}" type="datetimeFigureOut">
               <a:rPr lang="en-US" smtClean="0"/>
-              <a:t>12/8/2014</a:t>
+              <a:t>12/9/2014</a:t>
             </a:fld>
             <a:endParaRPr lang="en-US"/>
           </a:p>
@@ -2564,7 +3002,7 @@
           <a:p>
             <a:fld id="{CA8AF1EC-5B5A-4907-A408-775BA283839D}" type="datetimeFigureOut">
               <a:rPr lang="en-US" smtClean="0"/>
-              <a:t>12/8/2014</a:t>
+              <a:t>12/9/2014</a:t>
             </a:fld>
             <a:endParaRPr lang="en-US"/>
           </a:p>
@@ -5930,6 +6368,613 @@
 </p:sld>
 </file>
 
+<file path=ppt/slides/slide2.xml><?xml version="1.0" encoding="utf-8"?>
+<p:sld xmlns:a="http://schemas.openxmlformats.org/drawingml/2006/main" xmlns:r="http://schemas.openxmlformats.org/officeDocument/2006/relationships" xmlns:p="http://schemas.openxmlformats.org/presentationml/2006/main">
+  <p:cSld>
+    <p:spTree>
+      <p:nvGrpSpPr>
+        <p:cNvPr id="1" name=""/>
+        <p:cNvGrpSpPr/>
+        <p:nvPr/>
+      </p:nvGrpSpPr>
+      <p:grpSpPr>
+        <a:xfrm>
+          <a:off x="0" y="0"/>
+          <a:ext cx="0" cy="0"/>
+          <a:chOff x="0" y="0"/>
+          <a:chExt cx="0" cy="0"/>
+        </a:xfrm>
+      </p:grpSpPr>
+      <p:pic>
+        <p:nvPicPr>
+          <p:cNvPr id="2" name="Picture 1"/>
+          <p:cNvPicPr>
+            <a:picLocks noChangeAspect="1"/>
+          </p:cNvPicPr>
+          <p:nvPr/>
+        </p:nvPicPr>
+        <p:blipFill>
+          <a:blip r:embed="rId3" cstate="print">
+            <a:extLst>
+              <a:ext uri="{28A0092B-C50C-407E-A947-70E740481C1C}">
+                <a14:useLocalDpi xmlns:a14="http://schemas.microsoft.com/office/drawing/2010/main" val="0"/>
+              </a:ext>
+            </a:extLst>
+          </a:blip>
+          <a:stretch>
+            <a:fillRect/>
+          </a:stretch>
+        </p:blipFill>
+        <p:spPr>
+          <a:xfrm>
+            <a:off x="3399579" y="0"/>
+            <a:ext cx="5392842" cy="6858000"/>
+          </a:xfrm>
+          <a:prstGeom prst="rect">
+            <a:avLst/>
+          </a:prstGeom>
+        </p:spPr>
+      </p:pic>
+      <p:sp>
+        <p:nvSpPr>
+          <p:cNvPr id="3" name="TextBox 2"/>
+          <p:cNvSpPr txBox="1"/>
+          <p:nvPr/>
+        </p:nvSpPr>
+        <p:spPr>
+          <a:xfrm>
+            <a:off x="1726603" y="2173045"/>
+            <a:ext cx="1280479" cy="369332"/>
+          </a:xfrm>
+          <a:prstGeom prst="rect">
+            <a:avLst/>
+          </a:prstGeom>
+          <a:noFill/>
+        </p:spPr>
+        <p:txBody>
+          <a:bodyPr wrap="none" rtlCol="0">
+            <a:spAutoFit/>
+          </a:bodyPr>
+          <a:lstStyle/>
+          <a:p>
+            <a:r>
+              <a:rPr lang="en-US" dirty="0" smtClean="0"/>
+              <a:t>photodiode</a:t>
+            </a:r>
+            <a:endParaRPr lang="en-US" dirty="0"/>
+          </a:p>
+        </p:txBody>
+      </p:sp>
+      <p:sp>
+        <p:nvSpPr>
+          <p:cNvPr id="4" name="TextBox 3"/>
+          <p:cNvSpPr txBox="1"/>
+          <p:nvPr/>
+        </p:nvSpPr>
+        <p:spPr>
+          <a:xfrm>
+            <a:off x="1920240" y="1592132"/>
+            <a:ext cx="772969" cy="369332"/>
+          </a:xfrm>
+          <a:prstGeom prst="rect">
+            <a:avLst/>
+          </a:prstGeom>
+          <a:noFill/>
+        </p:spPr>
+        <p:txBody>
+          <a:bodyPr wrap="none" rtlCol="0">
+            <a:spAutoFit/>
+          </a:bodyPr>
+          <a:lstStyle/>
+          <a:p>
+            <a:r>
+              <a:rPr lang="en-US" dirty="0" smtClean="0"/>
+              <a:t>IR LED</a:t>
+            </a:r>
+            <a:endParaRPr lang="en-US" dirty="0"/>
+          </a:p>
+        </p:txBody>
+      </p:sp>
+      <p:cxnSp>
+        <p:nvCxnSpPr>
+          <p:cNvPr id="6" name="Straight Arrow Connector 5"/>
+          <p:cNvCxnSpPr>
+            <a:stCxn id="3" idx="3"/>
+          </p:cNvCxnSpPr>
+          <p:nvPr/>
+        </p:nvCxnSpPr>
+        <p:spPr>
+          <a:xfrm flipV="1">
+            <a:off x="3007082" y="2286000"/>
+            <a:ext cx="596730" cy="71711"/>
+          </a:xfrm>
+          <a:prstGeom prst="straightConnector1">
+            <a:avLst/>
+          </a:prstGeom>
+          <a:ln w="57150">
+            <a:solidFill>
+              <a:schemeClr val="accent2"/>
+            </a:solidFill>
+            <a:tailEnd type="triangle"/>
+          </a:ln>
+        </p:spPr>
+        <p:style>
+          <a:lnRef idx="1">
+            <a:schemeClr val="accent1"/>
+          </a:lnRef>
+          <a:fillRef idx="0">
+            <a:schemeClr val="accent1"/>
+          </a:fillRef>
+          <a:effectRef idx="0">
+            <a:schemeClr val="accent1"/>
+          </a:effectRef>
+          <a:fontRef idx="minor">
+            <a:schemeClr val="tx1"/>
+          </a:fontRef>
+        </p:style>
+      </p:cxnSp>
+      <p:cxnSp>
+        <p:nvCxnSpPr>
+          <p:cNvPr id="7" name="Straight Arrow Connector 6"/>
+          <p:cNvCxnSpPr/>
+          <p:nvPr/>
+        </p:nvCxnSpPr>
+        <p:spPr>
+          <a:xfrm>
+            <a:off x="2711566" y="1776799"/>
+            <a:ext cx="892246" cy="303913"/>
+          </a:xfrm>
+          <a:prstGeom prst="straightConnector1">
+            <a:avLst/>
+          </a:prstGeom>
+          <a:ln w="57150">
+            <a:solidFill>
+              <a:schemeClr val="accent2"/>
+            </a:solidFill>
+            <a:tailEnd type="triangle"/>
+          </a:ln>
+        </p:spPr>
+        <p:style>
+          <a:lnRef idx="1">
+            <a:schemeClr val="accent1"/>
+          </a:lnRef>
+          <a:fillRef idx="0">
+            <a:schemeClr val="accent1"/>
+          </a:fillRef>
+          <a:effectRef idx="0">
+            <a:schemeClr val="accent1"/>
+          </a:effectRef>
+          <a:fontRef idx="minor">
+            <a:schemeClr val="tx1"/>
+          </a:fontRef>
+        </p:style>
+      </p:cxnSp>
+      <p:sp>
+        <p:nvSpPr>
+          <p:cNvPr id="9" name="TextBox 8"/>
+          <p:cNvSpPr txBox="1"/>
+          <p:nvPr/>
+        </p:nvSpPr>
+        <p:spPr>
+          <a:xfrm>
+            <a:off x="2125366" y="4446479"/>
+            <a:ext cx="715260" cy="369332"/>
+          </a:xfrm>
+          <a:prstGeom prst="rect">
+            <a:avLst/>
+          </a:prstGeom>
+          <a:noFill/>
+        </p:spPr>
+        <p:txBody>
+          <a:bodyPr wrap="none" rtlCol="0">
+            <a:spAutoFit/>
+          </a:bodyPr>
+          <a:lstStyle/>
+          <a:p>
+            <a:r>
+              <a:rPr lang="en-US" dirty="0" smtClean="0"/>
+              <a:t>digit1</a:t>
+            </a:r>
+            <a:endParaRPr lang="en-US" dirty="0"/>
+          </a:p>
+        </p:txBody>
+      </p:sp>
+      <p:sp>
+        <p:nvSpPr>
+          <p:cNvPr id="10" name="TextBox 9"/>
+          <p:cNvSpPr txBox="1"/>
+          <p:nvPr/>
+        </p:nvSpPr>
+        <p:spPr>
+          <a:xfrm>
+            <a:off x="2125366" y="4077147"/>
+            <a:ext cx="715260" cy="369332"/>
+          </a:xfrm>
+          <a:prstGeom prst="rect">
+            <a:avLst/>
+          </a:prstGeom>
+          <a:noFill/>
+        </p:spPr>
+        <p:txBody>
+          <a:bodyPr wrap="none" rtlCol="0">
+            <a:spAutoFit/>
+          </a:bodyPr>
+          <a:lstStyle/>
+          <a:p>
+            <a:r>
+              <a:rPr lang="en-US" dirty="0" smtClean="0"/>
+              <a:t>digit2</a:t>
+            </a:r>
+            <a:endParaRPr lang="en-US" dirty="0"/>
+          </a:p>
+        </p:txBody>
+      </p:sp>
+      <p:sp>
+        <p:nvSpPr>
+          <p:cNvPr id="11" name="TextBox 10"/>
+          <p:cNvSpPr txBox="1"/>
+          <p:nvPr/>
+        </p:nvSpPr>
+        <p:spPr>
+          <a:xfrm>
+            <a:off x="2125366" y="3707815"/>
+            <a:ext cx="715260" cy="369332"/>
+          </a:xfrm>
+          <a:prstGeom prst="rect">
+            <a:avLst/>
+          </a:prstGeom>
+          <a:noFill/>
+        </p:spPr>
+        <p:txBody>
+          <a:bodyPr wrap="none" rtlCol="0">
+            <a:spAutoFit/>
+          </a:bodyPr>
+          <a:lstStyle/>
+          <a:p>
+            <a:r>
+              <a:rPr lang="en-US" dirty="0" smtClean="0"/>
+              <a:t>digit3</a:t>
+            </a:r>
+            <a:endParaRPr lang="en-US" dirty="0"/>
+          </a:p>
+        </p:txBody>
+      </p:sp>
+      <p:cxnSp>
+        <p:nvCxnSpPr>
+          <p:cNvPr id="12" name="Straight Arrow Connector 11"/>
+          <p:cNvCxnSpPr/>
+          <p:nvPr/>
+        </p:nvCxnSpPr>
+        <p:spPr>
+          <a:xfrm flipV="1">
+            <a:off x="2802849" y="4631145"/>
+            <a:ext cx="800963" cy="12567"/>
+          </a:xfrm>
+          <a:prstGeom prst="straightConnector1">
+            <a:avLst/>
+          </a:prstGeom>
+          <a:ln w="57150">
+            <a:solidFill>
+              <a:schemeClr val="accent2"/>
+            </a:solidFill>
+            <a:tailEnd type="triangle"/>
+          </a:ln>
+        </p:spPr>
+        <p:style>
+          <a:lnRef idx="1">
+            <a:schemeClr val="accent1"/>
+          </a:lnRef>
+          <a:fillRef idx="0">
+            <a:schemeClr val="accent1"/>
+          </a:fillRef>
+          <a:effectRef idx="0">
+            <a:schemeClr val="accent1"/>
+          </a:effectRef>
+          <a:fontRef idx="minor">
+            <a:schemeClr val="tx1"/>
+          </a:fontRef>
+        </p:style>
+      </p:cxnSp>
+      <p:cxnSp>
+        <p:nvCxnSpPr>
+          <p:cNvPr id="16" name="Straight Arrow Connector 15"/>
+          <p:cNvCxnSpPr/>
+          <p:nvPr/>
+        </p:nvCxnSpPr>
+        <p:spPr>
+          <a:xfrm flipV="1">
+            <a:off x="2814057" y="4267216"/>
+            <a:ext cx="800963" cy="12567"/>
+          </a:xfrm>
+          <a:prstGeom prst="straightConnector1">
+            <a:avLst/>
+          </a:prstGeom>
+          <a:ln w="57150">
+            <a:solidFill>
+              <a:schemeClr val="accent2"/>
+            </a:solidFill>
+            <a:tailEnd type="triangle"/>
+          </a:ln>
+        </p:spPr>
+        <p:style>
+          <a:lnRef idx="1">
+            <a:schemeClr val="accent1"/>
+          </a:lnRef>
+          <a:fillRef idx="0">
+            <a:schemeClr val="accent1"/>
+          </a:fillRef>
+          <a:effectRef idx="0">
+            <a:schemeClr val="accent1"/>
+          </a:effectRef>
+          <a:fontRef idx="minor">
+            <a:schemeClr val="tx1"/>
+          </a:fontRef>
+        </p:style>
+      </p:cxnSp>
+      <p:cxnSp>
+        <p:nvCxnSpPr>
+          <p:cNvPr id="17" name="Straight Arrow Connector 16"/>
+          <p:cNvCxnSpPr/>
+          <p:nvPr/>
+        </p:nvCxnSpPr>
+        <p:spPr>
+          <a:xfrm flipV="1">
+            <a:off x="2814057" y="3905048"/>
+            <a:ext cx="800963" cy="12567"/>
+          </a:xfrm>
+          <a:prstGeom prst="straightConnector1">
+            <a:avLst/>
+          </a:prstGeom>
+          <a:ln w="57150">
+            <a:solidFill>
+              <a:schemeClr val="accent2"/>
+            </a:solidFill>
+            <a:tailEnd type="triangle"/>
+          </a:ln>
+        </p:spPr>
+        <p:style>
+          <a:lnRef idx="1">
+            <a:schemeClr val="accent1"/>
+          </a:lnRef>
+          <a:fillRef idx="0">
+            <a:schemeClr val="accent1"/>
+          </a:fillRef>
+          <a:effectRef idx="0">
+            <a:schemeClr val="accent1"/>
+          </a:effectRef>
+          <a:fontRef idx="minor">
+            <a:schemeClr val="tx1"/>
+          </a:fontRef>
+        </p:style>
+      </p:cxnSp>
+      <p:sp>
+        <p:nvSpPr>
+          <p:cNvPr id="18" name="TextBox 17"/>
+          <p:cNvSpPr txBox="1"/>
+          <p:nvPr/>
+        </p:nvSpPr>
+        <p:spPr>
+          <a:xfrm>
+            <a:off x="2345544" y="6146209"/>
+            <a:ext cx="914609" cy="369332"/>
+          </a:xfrm>
+          <a:prstGeom prst="rect">
+            <a:avLst/>
+          </a:prstGeom>
+          <a:noFill/>
+        </p:spPr>
+        <p:txBody>
+          <a:bodyPr wrap="none" rtlCol="0">
+            <a:spAutoFit/>
+          </a:bodyPr>
+          <a:lstStyle/>
+          <a:p>
+            <a:r>
+              <a:rPr lang="en-US" dirty="0" smtClean="0"/>
+              <a:t>speaker</a:t>
+            </a:r>
+            <a:endParaRPr lang="en-US" dirty="0"/>
+          </a:p>
+        </p:txBody>
+      </p:sp>
+      <p:cxnSp>
+        <p:nvCxnSpPr>
+          <p:cNvPr id="19" name="Straight Arrow Connector 18"/>
+          <p:cNvCxnSpPr>
+            <a:stCxn id="18" idx="3"/>
+          </p:cNvCxnSpPr>
+          <p:nvPr/>
+        </p:nvCxnSpPr>
+        <p:spPr>
+          <a:xfrm>
+            <a:off x="3260153" y="6330875"/>
+            <a:ext cx="1672228" cy="0"/>
+          </a:xfrm>
+          <a:prstGeom prst="straightConnector1">
+            <a:avLst/>
+          </a:prstGeom>
+          <a:ln w="57150">
+            <a:solidFill>
+              <a:schemeClr val="accent2"/>
+            </a:solidFill>
+            <a:tailEnd type="triangle"/>
+          </a:ln>
+        </p:spPr>
+        <p:style>
+          <a:lnRef idx="1">
+            <a:schemeClr val="accent1"/>
+          </a:lnRef>
+          <a:fillRef idx="0">
+            <a:schemeClr val="accent1"/>
+          </a:fillRef>
+          <a:effectRef idx="0">
+            <a:schemeClr val="accent1"/>
+          </a:effectRef>
+          <a:fontRef idx="minor">
+            <a:schemeClr val="tx1"/>
+          </a:fontRef>
+        </p:style>
+      </p:cxnSp>
+      <p:sp>
+        <p:nvSpPr>
+          <p:cNvPr id="23" name="TextBox 22"/>
+          <p:cNvSpPr txBox="1"/>
+          <p:nvPr/>
+        </p:nvSpPr>
+        <p:spPr>
+          <a:xfrm>
+            <a:off x="6913297" y="96819"/>
+            <a:ext cx="578748" cy="369332"/>
+          </a:xfrm>
+          <a:prstGeom prst="rect">
+            <a:avLst/>
+          </a:prstGeom>
+          <a:noFill/>
+        </p:spPr>
+        <p:txBody>
+          <a:bodyPr wrap="none" rtlCol="0">
+            <a:spAutoFit/>
+          </a:bodyPr>
+          <a:lstStyle/>
+          <a:p>
+            <a:r>
+              <a:rPr lang="en-US" dirty="0" smtClean="0"/>
+              <a:t>DAC</a:t>
+            </a:r>
+            <a:endParaRPr lang="en-US" dirty="0"/>
+          </a:p>
+        </p:txBody>
+      </p:sp>
+      <p:cxnSp>
+        <p:nvCxnSpPr>
+          <p:cNvPr id="24" name="Straight Arrow Connector 23"/>
+          <p:cNvCxnSpPr/>
+          <p:nvPr/>
+        </p:nvCxnSpPr>
+        <p:spPr>
+          <a:xfrm flipH="1">
+            <a:off x="5437991" y="392654"/>
+            <a:ext cx="1506070" cy="1965057"/>
+          </a:xfrm>
+          <a:prstGeom prst="straightConnector1">
+            <a:avLst/>
+          </a:prstGeom>
+          <a:ln w="57150">
+            <a:solidFill>
+              <a:schemeClr val="accent2"/>
+            </a:solidFill>
+            <a:tailEnd type="triangle"/>
+          </a:ln>
+        </p:spPr>
+        <p:style>
+          <a:lnRef idx="1">
+            <a:schemeClr val="accent1"/>
+          </a:lnRef>
+          <a:fillRef idx="0">
+            <a:schemeClr val="accent1"/>
+          </a:fillRef>
+          <a:effectRef idx="0">
+            <a:schemeClr val="accent1"/>
+          </a:effectRef>
+          <a:fontRef idx="minor">
+            <a:schemeClr val="tx1"/>
+          </a:fontRef>
+        </p:style>
+      </p:cxnSp>
+      <p:sp>
+        <p:nvSpPr>
+          <p:cNvPr id="28" name="TextBox 27"/>
+          <p:cNvSpPr txBox="1"/>
+          <p:nvPr/>
+        </p:nvSpPr>
+        <p:spPr>
+          <a:xfrm>
+            <a:off x="1723706" y="2811784"/>
+            <a:ext cx="1079142" cy="646331"/>
+          </a:xfrm>
+          <a:prstGeom prst="rect">
+            <a:avLst/>
+          </a:prstGeom>
+          <a:noFill/>
+        </p:spPr>
+        <p:txBody>
+          <a:bodyPr wrap="none" rtlCol="0">
+            <a:spAutoFit/>
+          </a:bodyPr>
+          <a:lstStyle/>
+          <a:p>
+            <a:pPr algn="ctr"/>
+            <a:r>
+              <a:rPr lang="en-US" dirty="0" smtClean="0"/>
+              <a:t>amplifier </a:t>
+            </a:r>
+          </a:p>
+          <a:p>
+            <a:pPr algn="ctr"/>
+            <a:r>
+              <a:rPr lang="en-US" dirty="0" smtClean="0"/>
+              <a:t>circuit</a:t>
+            </a:r>
+            <a:endParaRPr lang="en-US" dirty="0"/>
+          </a:p>
+        </p:txBody>
+      </p:sp>
+      <p:cxnSp>
+        <p:nvCxnSpPr>
+          <p:cNvPr id="29" name="Straight Arrow Connector 28"/>
+          <p:cNvCxnSpPr/>
+          <p:nvPr/>
+        </p:nvCxnSpPr>
+        <p:spPr>
+          <a:xfrm flipV="1">
+            <a:off x="2757207" y="2943982"/>
+            <a:ext cx="846605" cy="203535"/>
+          </a:xfrm>
+          <a:prstGeom prst="straightConnector1">
+            <a:avLst/>
+          </a:prstGeom>
+          <a:ln w="57150">
+            <a:solidFill>
+              <a:schemeClr val="accent2"/>
+            </a:solidFill>
+            <a:tailEnd type="triangle"/>
+          </a:ln>
+        </p:spPr>
+        <p:style>
+          <a:lnRef idx="1">
+            <a:schemeClr val="accent1"/>
+          </a:lnRef>
+          <a:fillRef idx="0">
+            <a:schemeClr val="accent1"/>
+          </a:fillRef>
+          <a:effectRef idx="0">
+            <a:schemeClr val="accent1"/>
+          </a:effectRef>
+          <a:fontRef idx="minor">
+            <a:schemeClr val="tx1"/>
+          </a:fontRef>
+        </p:style>
+      </p:cxnSp>
+    </p:spTree>
+    <p:extLst>
+      <p:ext uri="{BB962C8B-B14F-4D97-AF65-F5344CB8AC3E}">
+        <p14:creationId xmlns:p14="http://schemas.microsoft.com/office/powerpoint/2010/main" val="1756058192"/>
+      </p:ext>
+    </p:extLst>
+  </p:cSld>
+  <p:clrMapOvr>
+    <a:masterClrMapping/>
+  </p:clrMapOvr>
+  <p:timing>
+    <p:tnLst>
+      <p:par>
+        <p:cTn id="1" dur="indefinite" restart="never" nodeType="tmRoot"/>
+      </p:par>
+    </p:tnLst>
+  </p:timing>
+</p:sld>
+</file>
+
 <file path=ppt/theme/theme1.xml><?xml version="1.0" encoding="utf-8"?>
 <a:theme xmlns:a="http://schemas.openxmlformats.org/drawingml/2006/main" name="Office Theme">
   <a:themeElements>
@@ -6189,4 +7234,265 @@
     </a:ext>
   </a:extLst>
 </a:theme>
+</file>
+
+<file path=ppt/theme/theme2.xml><?xml version="1.0" encoding="utf-8"?>
+<a:theme xmlns:a="http://schemas.openxmlformats.org/drawingml/2006/main" name="Office Theme">
+  <a:themeElements>
+    <a:clrScheme name="Office">
+      <a:dk1>
+        <a:sysClr val="windowText" lastClr="000000"/>
+      </a:dk1>
+      <a:lt1>
+        <a:sysClr val="window" lastClr="FFFFFF"/>
+      </a:lt1>
+      <a:dk2>
+        <a:srgbClr val="44546A"/>
+      </a:dk2>
+      <a:lt2>
+        <a:srgbClr val="E7E6E6"/>
+      </a:lt2>
+      <a:accent1>
+        <a:srgbClr val="5B9BD5"/>
+      </a:accent1>
+      <a:accent2>
+        <a:srgbClr val="ED7D31"/>
+      </a:accent2>
+      <a:accent3>
+        <a:srgbClr val="A5A5A5"/>
+      </a:accent3>
+      <a:accent4>
+        <a:srgbClr val="FFC000"/>
+      </a:accent4>
+      <a:accent5>
+        <a:srgbClr val="4472C4"/>
+      </a:accent5>
+      <a:accent6>
+        <a:srgbClr val="70AD47"/>
+      </a:accent6>
+      <a:hlink>
+        <a:srgbClr val="0563C1"/>
+      </a:hlink>
+      <a:folHlink>
+        <a:srgbClr val="954F72"/>
+      </a:folHlink>
+    </a:clrScheme>
+    <a:fontScheme name="Office">
+      <a:majorFont>
+        <a:latin typeface="Calibri Light" panose="020F0302020204030204"/>
+        <a:ea typeface=""/>
+        <a:cs typeface=""/>
+        <a:font script="Jpan" typeface="ＭＳ Ｐゴシック"/>
+        <a:font script="Hang" typeface="맑은 고딕"/>
+        <a:font script="Hans" typeface="宋体"/>
+        <a:font script="Hant" typeface="新細明體"/>
+        <a:font script="Arab" typeface="Times New Roman"/>
+        <a:font script="Hebr" typeface="Times New Roman"/>
+        <a:font script="Thai" typeface="Angsana New"/>
+        <a:font script="Ethi" typeface="Nyala"/>
+        <a:font script="Beng" typeface="Vrinda"/>
+        <a:font script="Gujr" typeface="Shruti"/>
+        <a:font script="Khmr" typeface="MoolBoran"/>
+        <a:font script="Knda" typeface="Tunga"/>
+        <a:font script="Guru" typeface="Raavi"/>
+        <a:font script="Cans" typeface="Euphemia"/>
+        <a:font script="Cher" typeface="Plantagenet Cherokee"/>
+        <a:font script="Yiii" typeface="Microsoft Yi Baiti"/>
+        <a:font script="Tibt" typeface="Microsoft Himalaya"/>
+        <a:font script="Thaa" typeface="MV Boli"/>
+        <a:font script="Deva" typeface="Mangal"/>
+        <a:font script="Telu" typeface="Gautami"/>
+        <a:font script="Taml" typeface="Latha"/>
+        <a:font script="Syrc" typeface="Estrangelo Edessa"/>
+        <a:font script="Orya" typeface="Kalinga"/>
+        <a:font script="Mlym" typeface="Kartika"/>
+        <a:font script="Laoo" typeface="DokChampa"/>
+        <a:font script="Sinh" typeface="Iskoola Pota"/>
+        <a:font script="Mong" typeface="Mongolian Baiti"/>
+        <a:font script="Viet" typeface="Times New Roman"/>
+        <a:font script="Uigh" typeface="Microsoft Uighur"/>
+        <a:font script="Geor" typeface="Sylfaen"/>
+      </a:majorFont>
+      <a:minorFont>
+        <a:latin typeface="Calibri" panose="020F0502020204030204"/>
+        <a:ea typeface=""/>
+        <a:cs typeface=""/>
+        <a:font script="Jpan" typeface="ＭＳ Ｐゴシック"/>
+        <a:font script="Hang" typeface="맑은 고딕"/>
+        <a:font script="Hans" typeface="宋体"/>
+        <a:font script="Hant" typeface="新細明體"/>
+        <a:font script="Arab" typeface="Arial"/>
+        <a:font script="Hebr" typeface="Arial"/>
+        <a:font script="Thai" typeface="Cordia New"/>
+        <a:font script="Ethi" typeface="Nyala"/>
+        <a:font script="Beng" typeface="Vrinda"/>
+        <a:font script="Gujr" typeface="Shruti"/>
+        <a:font script="Khmr" typeface="DaunPenh"/>
+        <a:font script="Knda" typeface="Tunga"/>
+        <a:font script="Guru" typeface="Raavi"/>
+        <a:font script="Cans" typeface="Euphemia"/>
+        <a:font script="Cher" typeface="Plantagenet Cherokee"/>
+        <a:font script="Yiii" typeface="Microsoft Yi Baiti"/>
+        <a:font script="Tibt" typeface="Microsoft Himalaya"/>
+        <a:font script="Thaa" typeface="MV Boli"/>
+        <a:font script="Deva" typeface="Mangal"/>
+        <a:font script="Telu" typeface="Gautami"/>
+        <a:font script="Taml" typeface="Latha"/>
+        <a:font script="Syrc" typeface="Estrangelo Edessa"/>
+        <a:font script="Orya" typeface="Kalinga"/>
+        <a:font script="Mlym" typeface="Kartika"/>
+        <a:font script="Laoo" typeface="DokChampa"/>
+        <a:font script="Sinh" typeface="Iskoola Pota"/>
+        <a:font script="Mong" typeface="Mongolian Baiti"/>
+        <a:font script="Viet" typeface="Arial"/>
+        <a:font script="Uigh" typeface="Microsoft Uighur"/>
+        <a:font script="Geor" typeface="Sylfaen"/>
+      </a:minorFont>
+    </a:fontScheme>
+    <a:fmtScheme name="Office">
+      <a:fillStyleLst>
+        <a:solidFill>
+          <a:schemeClr val="phClr"/>
+        </a:solidFill>
+        <a:gradFill rotWithShape="1">
+          <a:gsLst>
+            <a:gs pos="0">
+              <a:schemeClr val="phClr">
+                <a:lumMod val="110000"/>
+                <a:satMod val="105000"/>
+                <a:tint val="67000"/>
+              </a:schemeClr>
+            </a:gs>
+            <a:gs pos="50000">
+              <a:schemeClr val="phClr">
+                <a:lumMod val="105000"/>
+                <a:satMod val="103000"/>
+                <a:tint val="73000"/>
+              </a:schemeClr>
+            </a:gs>
+            <a:gs pos="100000">
+              <a:schemeClr val="phClr">
+                <a:lumMod val="105000"/>
+                <a:satMod val="109000"/>
+                <a:tint val="81000"/>
+              </a:schemeClr>
+            </a:gs>
+          </a:gsLst>
+          <a:lin ang="5400000" scaled="0"/>
+        </a:gradFill>
+        <a:gradFill rotWithShape="1">
+          <a:gsLst>
+            <a:gs pos="0">
+              <a:schemeClr val="phClr">
+                <a:satMod val="103000"/>
+                <a:lumMod val="102000"/>
+                <a:tint val="94000"/>
+              </a:schemeClr>
+            </a:gs>
+            <a:gs pos="50000">
+              <a:schemeClr val="phClr">
+                <a:satMod val="110000"/>
+                <a:lumMod val="100000"/>
+                <a:shade val="100000"/>
+              </a:schemeClr>
+            </a:gs>
+            <a:gs pos="100000">
+              <a:schemeClr val="phClr">
+                <a:lumMod val="99000"/>
+                <a:satMod val="120000"/>
+                <a:shade val="78000"/>
+              </a:schemeClr>
+            </a:gs>
+          </a:gsLst>
+          <a:lin ang="5400000" scaled="0"/>
+        </a:gradFill>
+      </a:fillStyleLst>
+      <a:lnStyleLst>
+        <a:ln w="6350" cap="flat" cmpd="sng" algn="ctr">
+          <a:solidFill>
+            <a:schemeClr val="phClr"/>
+          </a:solidFill>
+          <a:prstDash val="solid"/>
+          <a:miter lim="800000"/>
+        </a:ln>
+        <a:ln w="12700" cap="flat" cmpd="sng" algn="ctr">
+          <a:solidFill>
+            <a:schemeClr val="phClr"/>
+          </a:solidFill>
+          <a:prstDash val="solid"/>
+          <a:miter lim="800000"/>
+        </a:ln>
+        <a:ln w="19050" cap="flat" cmpd="sng" algn="ctr">
+          <a:solidFill>
+            <a:schemeClr val="phClr"/>
+          </a:solidFill>
+          <a:prstDash val="solid"/>
+          <a:miter lim="800000"/>
+        </a:ln>
+      </a:lnStyleLst>
+      <a:effectStyleLst>
+        <a:effectStyle>
+          <a:effectLst/>
+        </a:effectStyle>
+        <a:effectStyle>
+          <a:effectLst/>
+        </a:effectStyle>
+        <a:effectStyle>
+          <a:effectLst>
+            <a:outerShdw blurRad="57150" dist="19050" dir="5400000" algn="ctr" rotWithShape="0">
+              <a:srgbClr val="000000">
+                <a:alpha val="63000"/>
+              </a:srgbClr>
+            </a:outerShdw>
+          </a:effectLst>
+        </a:effectStyle>
+      </a:effectStyleLst>
+      <a:bgFillStyleLst>
+        <a:solidFill>
+          <a:schemeClr val="phClr"/>
+        </a:solidFill>
+        <a:solidFill>
+          <a:schemeClr val="phClr">
+            <a:tint val="95000"/>
+            <a:satMod val="170000"/>
+          </a:schemeClr>
+        </a:solidFill>
+        <a:gradFill rotWithShape="1">
+          <a:gsLst>
+            <a:gs pos="0">
+              <a:schemeClr val="phClr">
+                <a:tint val="93000"/>
+                <a:satMod val="150000"/>
+                <a:shade val="98000"/>
+                <a:lumMod val="102000"/>
+              </a:schemeClr>
+            </a:gs>
+            <a:gs pos="50000">
+              <a:schemeClr val="phClr">
+                <a:tint val="98000"/>
+                <a:satMod val="130000"/>
+                <a:shade val="90000"/>
+                <a:lumMod val="103000"/>
+              </a:schemeClr>
+            </a:gs>
+            <a:gs pos="100000">
+              <a:schemeClr val="phClr">
+                <a:shade val="63000"/>
+                <a:satMod val="120000"/>
+              </a:schemeClr>
+            </a:gs>
+          </a:gsLst>
+          <a:lin ang="5400000" scaled="0"/>
+        </a:gradFill>
+      </a:bgFillStyleLst>
+    </a:fmtScheme>
+  </a:themeElements>
+  <a:objectDefaults/>
+  <a:extraClrSchemeLst/>
+  <a:extLst>
+    <a:ext uri="{05A4C25C-085E-4340-85A3-A5531E510DB2}">
+      <thm15:themeFamily xmlns:thm15="http://schemas.microsoft.com/office/thememl/2012/main" name="Office Theme" id="{62F939B6-93AF-4DB8-9C6B-D6C7DFDC589F}" vid="{4A3C46E8-61CC-4603-A589-7422A47A8E4A}"/>
+    </a:ext>
+  </a:extLst>
+</a:theme>
 </file>
</xml_diff>